<commit_message>
dessertation ppt slide updated
</commit_message>
<xml_diff>
--- a/mani_sujil_dessertation_ppt.pptx
+++ b/mani_sujil_dessertation_ppt.pptx
@@ -16,11 +16,11 @@
     <p:sldId id="268" r:id="rId4"/>
     <p:sldId id="269" r:id="rId5"/>
     <p:sldId id="266" r:id="rId6"/>
-    <p:sldId id="264" r:id="rId7"/>
-    <p:sldId id="278" r:id="rId8"/>
-    <p:sldId id="275" r:id="rId9"/>
-    <p:sldId id="276" r:id="rId10"/>
-    <p:sldId id="277" r:id="rId11"/>
+    <p:sldId id="278" r:id="rId7"/>
+    <p:sldId id="275" r:id="rId8"/>
+    <p:sldId id="276" r:id="rId9"/>
+    <p:sldId id="277" r:id="rId10"/>
+    <p:sldId id="264" r:id="rId11"/>
     <p:sldId id="273" r:id="rId12"/>
     <p:sldId id="271" r:id="rId13"/>
   </p:sldIdLst>
@@ -226,7 +226,7 @@
           <a:p>
             <a:fld id="{73B2889B-A0AC-4482-8592-5C96F2309420}" type="datetimeFigureOut">
               <a:rPr lang="en-US" smtClean="0"/>
-              <a:t>9/11/2022</a:t>
+              <a:t>9/12/2022</a:t>
             </a:fld>
             <a:endParaRPr lang="en-US"/>
           </a:p>
@@ -403,7 +403,7 @@
           <a:p>
             <a:fld id="{830EB223-FFC0-462A-A3B8-EAA7CE0F8CBD}" type="datetimeFigureOut">
               <a:rPr lang="en-US" smtClean="0"/>
-              <a:t>9/11/2022</a:t>
+              <a:t>9/12/2022</a:t>
             </a:fld>
             <a:endParaRPr lang="en-US" dirty="0"/>
           </a:p>
@@ -1303,7 +1303,7 @@
           <a:p>
             <a:fld id="{BC849E9A-41F7-4779-A581-48A7C374A227}" type="slidenum">
               <a:rPr lang="en-US" smtClean="0"/>
-              <a:t>6</a:t>
+              <a:t>10</a:t>
             </a:fld>
             <a:endParaRPr lang="en-US" dirty="0"/>
           </a:p>
@@ -1469,7 +1469,7 @@
           <a:p>
             <a:fld id="{C7916466-B1A1-451F-BD9F-8B3041BA2C50}" type="datetime1">
               <a:rPr lang="en-US" smtClean="0"/>
-              <a:t>9/11/2022</a:t>
+              <a:t>9/12/2022</a:t>
             </a:fld>
             <a:endParaRPr lang="en-US" dirty="0"/>
           </a:p>
@@ -1671,7 +1671,7 @@
           <a:p>
             <a:fld id="{26DC40AF-FAFA-499C-97F9-4F611C0F1809}" type="datetime1">
               <a:rPr lang="en-US" smtClean="0"/>
-              <a:t>9/11/2022</a:t>
+              <a:t>9/12/2022</a:t>
             </a:fld>
             <a:endParaRPr lang="en-US" dirty="0"/>
           </a:p>
@@ -1883,7 +1883,7 @@
           <a:p>
             <a:fld id="{26B8165A-1010-4015-8221-B3A0BF95DA5B}" type="datetime1">
               <a:rPr lang="en-US" smtClean="0"/>
-              <a:t>9/11/2022</a:t>
+              <a:t>9/12/2022</a:t>
             </a:fld>
             <a:endParaRPr lang="en-US" dirty="0"/>
           </a:p>
@@ -2085,7 +2085,7 @@
           <a:p>
             <a:fld id="{9BD93BEC-ECAF-4B6D-85A8-81CF657F2418}" type="datetime1">
               <a:rPr lang="en-US" smtClean="0"/>
-              <a:t>9/11/2022</a:t>
+              <a:t>9/12/2022</a:t>
             </a:fld>
             <a:endParaRPr lang="en-US" dirty="0"/>
           </a:p>
@@ -2364,7 +2364,7 @@
           <a:p>
             <a:fld id="{CD076501-56DC-48DD-A903-7CC590F86269}" type="datetime1">
               <a:rPr lang="en-US" smtClean="0"/>
-              <a:t>9/11/2022</a:t>
+              <a:t>9/12/2022</a:t>
             </a:fld>
             <a:endParaRPr lang="en-US" dirty="0"/>
           </a:p>
@@ -2633,7 +2633,7 @@
           <a:p>
             <a:fld id="{802FD752-8A43-478D-B3F3-E6AEFD09BCC5}" type="datetime1">
               <a:rPr lang="en-US" smtClean="0"/>
-              <a:t>9/11/2022</a:t>
+              <a:t>9/12/2022</a:t>
             </a:fld>
             <a:endParaRPr lang="en-US" dirty="0"/>
           </a:p>
@@ -3049,7 +3049,7 @@
           <a:p>
             <a:fld id="{D281A3BB-F3D9-4E74-BC44-792A5E4A95FD}" type="datetime1">
               <a:rPr lang="en-US" smtClean="0"/>
-              <a:t>9/11/2022</a:t>
+              <a:t>9/12/2022</a:t>
             </a:fld>
             <a:endParaRPr lang="en-US" dirty="0"/>
           </a:p>
@@ -3194,7 +3194,7 @@
           <a:p>
             <a:fld id="{E2460BF0-C7B5-42BF-AF94-1C59DB5412C3}" type="datetime1">
               <a:rPr lang="en-US" smtClean="0"/>
-              <a:t>9/11/2022</a:t>
+              <a:t>9/12/2022</a:t>
             </a:fld>
             <a:endParaRPr lang="en-US" dirty="0"/>
           </a:p>
@@ -3311,7 +3311,7 @@
           <a:p>
             <a:fld id="{84472C61-172B-426D-9CFD-8DC9BD39F636}" type="datetime1">
               <a:rPr lang="en-US" smtClean="0"/>
-              <a:t>9/11/2022</a:t>
+              <a:t>9/12/2022</a:t>
             </a:fld>
             <a:endParaRPr lang="en-US" dirty="0"/>
           </a:p>
@@ -3626,7 +3626,7 @@
           <a:p>
             <a:fld id="{DD60A37D-A884-4478-938D-58F4E2159209}" type="datetime1">
               <a:rPr lang="en-US" smtClean="0"/>
-              <a:t>9/11/2022</a:t>
+              <a:t>9/12/2022</a:t>
             </a:fld>
             <a:endParaRPr lang="en-US" dirty="0"/>
           </a:p>
@@ -3918,7 +3918,7 @@
           <a:p>
             <a:fld id="{1F7FB9DF-2013-41F8-B63B-5BB3BB8EC338}" type="datetime1">
               <a:rPr lang="en-US" smtClean="0"/>
-              <a:t>9/11/2022</a:t>
+              <a:t>9/12/2022</a:t>
             </a:fld>
             <a:endParaRPr lang="en-US" dirty="0"/>
           </a:p>
@@ -4163,7 +4163,7 @@
           <a:p>
             <a:fld id="{756CD18A-834F-4D25-BA74-3E44D6F8B3D1}" type="datetime1">
               <a:rPr lang="en-US" smtClean="0"/>
-              <a:t>9/11/2022</a:t>
+              <a:t>9/12/2022</a:t>
             </a:fld>
             <a:endParaRPr lang="en-US" dirty="0"/>
           </a:p>
@@ -4786,6 +4786,14 @@
 <file path=ppt/slides/slide10.xml><?xml version="1.0" encoding="utf-8"?>
 <p:sld xmlns:a="http://schemas.openxmlformats.org/drawingml/2006/main" xmlns:r="http://schemas.openxmlformats.org/officeDocument/2006/relationships" xmlns:p="http://schemas.openxmlformats.org/presentationml/2006/main">
   <p:cSld>
+    <p:bg>
+      <p:bgPr>
+        <a:solidFill>
+          <a:schemeClr val="bg1"/>
+        </a:solidFill>
+        <a:effectLst/>
+      </p:bgPr>
+    </p:bg>
     <p:spTree>
       <p:nvGrpSpPr>
         <p:cNvPr id="1" name=""/>
@@ -4802,10 +4810,56 @@
       </p:grpSpPr>
       <p:sp>
         <p:nvSpPr>
-          <p:cNvPr id="4" name="Footer Placeholder 3">
-            <a:extLst>
-              <a:ext uri="{FF2B5EF4-FFF2-40B4-BE49-F238E27FC236}">
-                <a16:creationId xmlns:a16="http://schemas.microsoft.com/office/drawing/2014/main" id="{3D86EA1F-4003-772F-F5A3-075A007CAD07}"/>
+          <p:cNvPr id="4" name="Rectangle 3">
+            <a:extLst>
+              <a:ext uri="{FF2B5EF4-FFF2-40B4-BE49-F238E27FC236}">
+                <a16:creationId xmlns:a16="http://schemas.microsoft.com/office/drawing/2014/main" id="{6CCB6BD9-4D69-4662-86E5-9D71EF9B662B}"/>
+              </a:ext>
+            </a:extLst>
+          </p:cNvPr>
+          <p:cNvSpPr/>
+          <p:nvPr/>
+        </p:nvSpPr>
+        <p:spPr>
+          <a:xfrm>
+            <a:off x="0" y="6202042"/>
+            <a:ext cx="12192000" cy="655958"/>
+          </a:xfrm>
+          <a:prstGeom prst="rect">
+            <a:avLst/>
+          </a:prstGeom>
+        </p:spPr>
+        <p:style>
+          <a:lnRef idx="2">
+            <a:schemeClr val="accent1">
+              <a:shade val="50000"/>
+            </a:schemeClr>
+          </a:lnRef>
+          <a:fillRef idx="1">
+            <a:schemeClr val="accent1"/>
+          </a:fillRef>
+          <a:effectRef idx="0">
+            <a:schemeClr val="accent1"/>
+          </a:effectRef>
+          <a:fontRef idx="minor">
+            <a:schemeClr val="lt1"/>
+          </a:fontRef>
+        </p:style>
+        <p:txBody>
+          <a:bodyPr rtlCol="0" anchor="ctr"/>
+          <a:lstStyle/>
+          <a:p>
+            <a:pPr algn="ctr"/>
+            <a:endParaRPr lang="en-US"/>
+          </a:p>
+        </p:txBody>
+      </p:sp>
+      <p:sp>
+        <p:nvSpPr>
+          <p:cNvPr id="2" name="Footer Placeholder 1">
+            <a:extLst>
+              <a:ext uri="{FF2B5EF4-FFF2-40B4-BE49-F238E27FC236}">
+                <a16:creationId xmlns:a16="http://schemas.microsoft.com/office/drawing/2014/main" id="{1F982B3B-45C9-4A30-99FB-7BA28997ECFD}"/>
               </a:ext>
             </a:extLst>
           </p:cNvPr>
@@ -4822,53 +4876,813 @@
           <a:lstStyle/>
           <a:p>
             <a:r>
-              <a:rPr lang="en-US"/>
-              <a:t>Dundalk Institute Of Technology</a:t>
-            </a:r>
-            <a:endParaRPr lang="en-US" dirty="0"/>
+              <a:rPr lang="en-US" dirty="0">
+                <a:solidFill>
+                  <a:schemeClr val="bg1"/>
+                </a:solidFill>
+              </a:rPr>
+              <a:t>Dundalk Institute of Technology</a:t>
+            </a:r>
+          </a:p>
+        </p:txBody>
+      </p:sp>
+      <p:sp>
+        <p:nvSpPr>
+          <p:cNvPr id="7" name="TextBox 6">
+            <a:extLst>
+              <a:ext uri="{FF2B5EF4-FFF2-40B4-BE49-F238E27FC236}">
+                <a16:creationId xmlns:a16="http://schemas.microsoft.com/office/drawing/2014/main" id="{4D8669B1-5C46-40FC-89AC-B36E5234A04C}"/>
+              </a:ext>
+            </a:extLst>
+          </p:cNvPr>
+          <p:cNvSpPr txBox="1"/>
+          <p:nvPr/>
+        </p:nvSpPr>
+        <p:spPr>
+          <a:xfrm>
+            <a:off x="1619534" y="343646"/>
+            <a:ext cx="8952931" cy="830997"/>
+          </a:xfrm>
+          <a:prstGeom prst="rect">
+            <a:avLst/>
+          </a:prstGeom>
+          <a:noFill/>
+        </p:spPr>
+        <p:txBody>
+          <a:bodyPr wrap="square">
+            <a:spAutoFit/>
+          </a:bodyPr>
+          <a:lstStyle/>
+          <a:p>
+            <a:pPr algn="ctr"/>
+            <a:r>
+              <a:rPr lang="en-US" sz="4800" b="1" dirty="0">
+                <a:solidFill>
+                  <a:schemeClr val="accent5">
+                    <a:lumMod val="50000"/>
+                  </a:schemeClr>
+                </a:solidFill>
+                <a:effectLst>
+                  <a:outerShdw blurRad="38100" dist="38100" dir="2700000" algn="tl">
+                    <a:srgbClr val="000000">
+                      <a:alpha val="43137"/>
+                    </a:srgbClr>
+                  </a:outerShdw>
+                </a:effectLst>
+                <a:latin typeface="Bahnschrift Light SemiCondensed" panose="020B0502040204020203" pitchFamily="34" charset="0"/>
+              </a:rPr>
+              <a:t>Conclusion</a:t>
+            </a:r>
+          </a:p>
+        </p:txBody>
+      </p:sp>
+      <p:sp>
+        <p:nvSpPr>
+          <p:cNvPr id="16" name="Oval 15">
+            <a:extLst>
+              <a:ext uri="{FF2B5EF4-FFF2-40B4-BE49-F238E27FC236}">
+                <a16:creationId xmlns:a16="http://schemas.microsoft.com/office/drawing/2014/main" id="{3E8EA68D-AAC2-4BD2-957A-236B86BAA6C2}"/>
+              </a:ext>
+            </a:extLst>
+          </p:cNvPr>
+          <p:cNvSpPr/>
+          <p:nvPr/>
+        </p:nvSpPr>
+        <p:spPr>
+          <a:xfrm>
+            <a:off x="419860" y="2925359"/>
+            <a:ext cx="202032" cy="224597"/>
+          </a:xfrm>
+          <a:prstGeom prst="ellipse">
+            <a:avLst/>
+          </a:prstGeom>
+          <a:solidFill>
+            <a:schemeClr val="accent1"/>
+          </a:solidFill>
+          <a:ln>
+            <a:noFill/>
+          </a:ln>
+          <a:effectLst>
+            <a:outerShdw blurRad="107950" dist="12700" dir="5400000" algn="ctr">
+              <a:srgbClr val="000000"/>
+            </a:outerShdw>
+          </a:effectLst>
+          <a:scene3d>
+            <a:camera prst="orthographicFront">
+              <a:rot lat="0" lon="0" rev="0"/>
+            </a:camera>
+            <a:lightRig rig="soft" dir="t">
+              <a:rot lat="0" lon="0" rev="0"/>
+            </a:lightRig>
+          </a:scene3d>
+          <a:sp3d contourW="44450" prstMaterial="matte">
+            <a:bevelT w="63500" h="63500" prst="artDeco"/>
+            <a:contourClr>
+              <a:srgbClr val="FFFFFF"/>
+            </a:contourClr>
+          </a:sp3d>
+        </p:spPr>
+        <p:style>
+          <a:lnRef idx="2">
+            <a:schemeClr val="dk1">
+              <a:shade val="50000"/>
+            </a:schemeClr>
+          </a:lnRef>
+          <a:fillRef idx="1">
+            <a:schemeClr val="dk1"/>
+          </a:fillRef>
+          <a:effectRef idx="0">
+            <a:schemeClr val="dk1"/>
+          </a:effectRef>
+          <a:fontRef idx="minor">
+            <a:schemeClr val="lt1"/>
+          </a:fontRef>
+        </p:style>
+        <p:txBody>
+          <a:bodyPr rtlCol="0" anchor="ctr"/>
+          <a:lstStyle/>
+          <a:p>
+            <a:pPr algn="ctr"/>
+            <a:endParaRPr lang="en-US"/>
+          </a:p>
+        </p:txBody>
+      </p:sp>
+      <p:sp>
+        <p:nvSpPr>
+          <p:cNvPr id="17" name="Oval 16">
+            <a:extLst>
+              <a:ext uri="{FF2B5EF4-FFF2-40B4-BE49-F238E27FC236}">
+                <a16:creationId xmlns:a16="http://schemas.microsoft.com/office/drawing/2014/main" id="{7D0B9510-9AE9-4398-8334-5101C156021E}"/>
+              </a:ext>
+            </a:extLst>
+          </p:cNvPr>
+          <p:cNvSpPr/>
+          <p:nvPr/>
+        </p:nvSpPr>
+        <p:spPr>
+          <a:xfrm>
+            <a:off x="419860" y="3524828"/>
+            <a:ext cx="202032" cy="224597"/>
+          </a:xfrm>
+          <a:prstGeom prst="ellipse">
+            <a:avLst/>
+          </a:prstGeom>
+          <a:solidFill>
+            <a:schemeClr val="accent1"/>
+          </a:solidFill>
+          <a:ln>
+            <a:noFill/>
+          </a:ln>
+          <a:effectLst>
+            <a:outerShdw blurRad="107950" dist="12700" dir="5400000" algn="ctr">
+              <a:srgbClr val="000000"/>
+            </a:outerShdw>
+          </a:effectLst>
+          <a:scene3d>
+            <a:camera prst="orthographicFront">
+              <a:rot lat="0" lon="0" rev="0"/>
+            </a:camera>
+            <a:lightRig rig="soft" dir="t">
+              <a:rot lat="0" lon="0" rev="0"/>
+            </a:lightRig>
+          </a:scene3d>
+          <a:sp3d contourW="44450" prstMaterial="matte">
+            <a:bevelT w="63500" h="63500" prst="artDeco"/>
+            <a:contourClr>
+              <a:srgbClr val="FFFFFF"/>
+            </a:contourClr>
+          </a:sp3d>
+        </p:spPr>
+        <p:style>
+          <a:lnRef idx="2">
+            <a:schemeClr val="dk1">
+              <a:shade val="50000"/>
+            </a:schemeClr>
+          </a:lnRef>
+          <a:fillRef idx="1">
+            <a:schemeClr val="dk1"/>
+          </a:fillRef>
+          <a:effectRef idx="0">
+            <a:schemeClr val="dk1"/>
+          </a:effectRef>
+          <a:fontRef idx="minor">
+            <a:schemeClr val="lt1"/>
+          </a:fontRef>
+        </p:style>
+        <p:txBody>
+          <a:bodyPr rtlCol="0" anchor="ctr"/>
+          <a:lstStyle/>
+          <a:p>
+            <a:pPr algn="ctr"/>
+            <a:endParaRPr lang="en-US"/>
+          </a:p>
+        </p:txBody>
+      </p:sp>
+      <p:sp>
+        <p:nvSpPr>
+          <p:cNvPr id="19" name="TextBox 18">
+            <a:extLst>
+              <a:ext uri="{FF2B5EF4-FFF2-40B4-BE49-F238E27FC236}">
+                <a16:creationId xmlns:a16="http://schemas.microsoft.com/office/drawing/2014/main" id="{6996685C-75E3-4E35-834F-1264055670BE}"/>
+              </a:ext>
+            </a:extLst>
+          </p:cNvPr>
+          <p:cNvSpPr txBox="1"/>
+          <p:nvPr/>
+        </p:nvSpPr>
+        <p:spPr>
+          <a:xfrm>
+            <a:off x="686559" y="2175673"/>
+            <a:ext cx="5388013" cy="523220"/>
+          </a:xfrm>
+          <a:prstGeom prst="rect">
+            <a:avLst/>
+          </a:prstGeom>
+          <a:noFill/>
+        </p:spPr>
+        <p:txBody>
+          <a:bodyPr wrap="none" rtlCol="0">
+            <a:spAutoFit/>
+          </a:bodyPr>
+          <a:lstStyle/>
+          <a:p>
+            <a:r>
+              <a:rPr lang="en-US" sz="2800" dirty="0">
+                <a:solidFill>
+                  <a:schemeClr val="bg2">
+                    <a:lumMod val="25000"/>
+                  </a:schemeClr>
+                </a:solidFill>
+                <a:latin typeface="Bahnschrift Light SemiCondensed" panose="020B0502040204020203" pitchFamily="34" charset="0"/>
+              </a:rPr>
+              <a:t>SARIMAX outperformed other models</a:t>
+            </a:r>
+          </a:p>
+        </p:txBody>
+      </p:sp>
+      <p:sp>
+        <p:nvSpPr>
+          <p:cNvPr id="21" name="TextBox 20">
+            <a:extLst>
+              <a:ext uri="{FF2B5EF4-FFF2-40B4-BE49-F238E27FC236}">
+                <a16:creationId xmlns:a16="http://schemas.microsoft.com/office/drawing/2014/main" id="{C7BF364A-D2A6-412E-8B5C-B18CE58B3D2E}"/>
+              </a:ext>
+            </a:extLst>
+          </p:cNvPr>
+          <p:cNvSpPr txBox="1"/>
+          <p:nvPr/>
+        </p:nvSpPr>
+        <p:spPr>
+          <a:xfrm>
+            <a:off x="681843" y="3358912"/>
+            <a:ext cx="4969630" cy="523220"/>
+          </a:xfrm>
+          <a:prstGeom prst="rect">
+            <a:avLst/>
+          </a:prstGeom>
+          <a:noFill/>
+        </p:spPr>
+        <p:txBody>
+          <a:bodyPr wrap="none" rtlCol="0">
+            <a:spAutoFit/>
+          </a:bodyPr>
+          <a:lstStyle/>
+          <a:p>
+            <a:r>
+              <a:rPr lang="en-US" sz="2800" dirty="0">
+                <a:solidFill>
+                  <a:schemeClr val="bg2">
+                    <a:lumMod val="25000"/>
+                  </a:schemeClr>
+                </a:solidFill>
+                <a:latin typeface="Bahnschrift Light SemiCondensed" panose="020B0502040204020203" pitchFamily="34" charset="0"/>
+              </a:rPr>
+              <a:t>Cron Jobs made the app real-time</a:t>
+            </a:r>
+          </a:p>
+        </p:txBody>
+      </p:sp>
+      <p:sp>
+        <p:nvSpPr>
+          <p:cNvPr id="25" name="Oval 24">
+            <a:extLst>
+              <a:ext uri="{FF2B5EF4-FFF2-40B4-BE49-F238E27FC236}">
+                <a16:creationId xmlns:a16="http://schemas.microsoft.com/office/drawing/2014/main" id="{B0A59C5C-C8F1-4172-A9BD-37120DDC0E11}"/>
+              </a:ext>
+            </a:extLst>
+          </p:cNvPr>
+          <p:cNvSpPr/>
+          <p:nvPr/>
+        </p:nvSpPr>
+        <p:spPr>
+          <a:xfrm>
+            <a:off x="419860" y="2328573"/>
+            <a:ext cx="202032" cy="224597"/>
+          </a:xfrm>
+          <a:prstGeom prst="ellipse">
+            <a:avLst/>
+          </a:prstGeom>
+          <a:solidFill>
+            <a:schemeClr val="accent1"/>
+          </a:solidFill>
+          <a:ln>
+            <a:noFill/>
+          </a:ln>
+          <a:effectLst>
+            <a:outerShdw blurRad="107950" dist="12700" dir="5400000" algn="ctr">
+              <a:srgbClr val="000000"/>
+            </a:outerShdw>
+          </a:effectLst>
+          <a:scene3d>
+            <a:camera prst="orthographicFront">
+              <a:rot lat="0" lon="0" rev="0"/>
+            </a:camera>
+            <a:lightRig rig="soft" dir="t">
+              <a:rot lat="0" lon="0" rev="0"/>
+            </a:lightRig>
+          </a:scene3d>
+          <a:sp3d contourW="44450" prstMaterial="matte">
+            <a:bevelT w="63500" h="63500" prst="artDeco"/>
+            <a:contourClr>
+              <a:srgbClr val="FFFFFF"/>
+            </a:contourClr>
+          </a:sp3d>
+        </p:spPr>
+        <p:style>
+          <a:lnRef idx="2">
+            <a:schemeClr val="dk1">
+              <a:shade val="50000"/>
+            </a:schemeClr>
+          </a:lnRef>
+          <a:fillRef idx="1">
+            <a:schemeClr val="dk1"/>
+          </a:fillRef>
+          <a:effectRef idx="0">
+            <a:schemeClr val="dk1"/>
+          </a:effectRef>
+          <a:fontRef idx="minor">
+            <a:schemeClr val="lt1"/>
+          </a:fontRef>
+        </p:style>
+        <p:txBody>
+          <a:bodyPr rtlCol="0" anchor="ctr"/>
+          <a:lstStyle/>
+          <a:p>
+            <a:pPr algn="ctr"/>
+            <a:endParaRPr lang="en-US"/>
+          </a:p>
+        </p:txBody>
+      </p:sp>
+      <p:sp>
+        <p:nvSpPr>
+          <p:cNvPr id="23" name="TextBox 22">
+            <a:extLst>
+              <a:ext uri="{FF2B5EF4-FFF2-40B4-BE49-F238E27FC236}">
+                <a16:creationId xmlns:a16="http://schemas.microsoft.com/office/drawing/2014/main" id="{83D2D3E0-4475-45EA-918B-4FEF1B153184}"/>
+              </a:ext>
+            </a:extLst>
+          </p:cNvPr>
+          <p:cNvSpPr txBox="1"/>
+          <p:nvPr/>
+        </p:nvSpPr>
+        <p:spPr>
+          <a:xfrm>
+            <a:off x="686560" y="2776047"/>
+            <a:ext cx="6029215" cy="523220"/>
+          </a:xfrm>
+          <a:prstGeom prst="rect">
+            <a:avLst/>
+          </a:prstGeom>
+          <a:noFill/>
+        </p:spPr>
+        <p:txBody>
+          <a:bodyPr wrap="none" rtlCol="0">
+            <a:spAutoFit/>
+          </a:bodyPr>
+          <a:lstStyle/>
+          <a:p>
+            <a:r>
+              <a:rPr lang="en-US" sz="2800" dirty="0">
+                <a:solidFill>
+                  <a:schemeClr val="bg2">
+                    <a:lumMod val="25000"/>
+                  </a:schemeClr>
+                </a:solidFill>
+                <a:latin typeface="Bahnschrift Light SemiCondensed" panose="020B0502040204020203" pitchFamily="34" charset="0"/>
+              </a:rPr>
+              <a:t>Moderate results from FB Prophet and AR</a:t>
+            </a:r>
+          </a:p>
+        </p:txBody>
+      </p:sp>
+      <p:sp>
+        <p:nvSpPr>
+          <p:cNvPr id="28" name="Oval 27">
+            <a:extLst>
+              <a:ext uri="{FF2B5EF4-FFF2-40B4-BE49-F238E27FC236}">
+                <a16:creationId xmlns:a16="http://schemas.microsoft.com/office/drawing/2014/main" id="{F695307C-611D-4A70-A743-3D1EDBD73022}"/>
+              </a:ext>
+            </a:extLst>
+          </p:cNvPr>
+          <p:cNvSpPr/>
+          <p:nvPr/>
+        </p:nvSpPr>
+        <p:spPr>
+          <a:xfrm>
+            <a:off x="419860" y="4125263"/>
+            <a:ext cx="202032" cy="224597"/>
+          </a:xfrm>
+          <a:prstGeom prst="ellipse">
+            <a:avLst/>
+          </a:prstGeom>
+          <a:solidFill>
+            <a:schemeClr val="accent1"/>
+          </a:solidFill>
+          <a:ln>
+            <a:noFill/>
+          </a:ln>
+          <a:effectLst>
+            <a:outerShdw blurRad="107950" dist="12700" dir="5400000" algn="ctr">
+              <a:srgbClr val="000000"/>
+            </a:outerShdw>
+          </a:effectLst>
+          <a:scene3d>
+            <a:camera prst="orthographicFront">
+              <a:rot lat="0" lon="0" rev="0"/>
+            </a:camera>
+            <a:lightRig rig="soft" dir="t">
+              <a:rot lat="0" lon="0" rev="0"/>
+            </a:lightRig>
+          </a:scene3d>
+          <a:sp3d contourW="44450" prstMaterial="matte">
+            <a:bevelT w="63500" h="63500" prst="artDeco"/>
+            <a:contourClr>
+              <a:srgbClr val="FFFFFF"/>
+            </a:contourClr>
+          </a:sp3d>
+        </p:spPr>
+        <p:style>
+          <a:lnRef idx="2">
+            <a:schemeClr val="dk1">
+              <a:shade val="50000"/>
+            </a:schemeClr>
+          </a:lnRef>
+          <a:fillRef idx="1">
+            <a:schemeClr val="dk1"/>
+          </a:fillRef>
+          <a:effectRef idx="0">
+            <a:schemeClr val="dk1"/>
+          </a:effectRef>
+          <a:fontRef idx="minor">
+            <a:schemeClr val="lt1"/>
+          </a:fontRef>
+        </p:style>
+        <p:txBody>
+          <a:bodyPr rtlCol="0" anchor="ctr"/>
+          <a:lstStyle/>
+          <a:p>
+            <a:pPr algn="ctr"/>
+            <a:endParaRPr lang="en-US"/>
+          </a:p>
+        </p:txBody>
+      </p:sp>
+      <p:sp>
+        <p:nvSpPr>
+          <p:cNvPr id="29" name="TextBox 28">
+            <a:extLst>
+              <a:ext uri="{FF2B5EF4-FFF2-40B4-BE49-F238E27FC236}">
+                <a16:creationId xmlns:a16="http://schemas.microsoft.com/office/drawing/2014/main" id="{9835D8A8-64EA-4B73-AA6D-E720F3E7A6F0}"/>
+              </a:ext>
+            </a:extLst>
+          </p:cNvPr>
+          <p:cNvSpPr txBox="1"/>
+          <p:nvPr/>
+        </p:nvSpPr>
+        <p:spPr>
+          <a:xfrm>
+            <a:off x="681843" y="3936002"/>
+            <a:ext cx="6402715" cy="523220"/>
+          </a:xfrm>
+          <a:prstGeom prst="rect">
+            <a:avLst/>
+          </a:prstGeom>
+          <a:noFill/>
+        </p:spPr>
+        <p:txBody>
+          <a:bodyPr wrap="none" rtlCol="0">
+            <a:spAutoFit/>
+          </a:bodyPr>
+          <a:lstStyle/>
+          <a:p>
+            <a:r>
+              <a:rPr lang="en-US" sz="2800" dirty="0">
+                <a:solidFill>
+                  <a:schemeClr val="bg2">
+                    <a:lumMod val="25000"/>
+                  </a:schemeClr>
+                </a:solidFill>
+                <a:latin typeface="Bahnschrift Light SemiCondensed" panose="020B0502040204020203" pitchFamily="34" charset="0"/>
+              </a:rPr>
+              <a:t>Effective Visualisations for general audience</a:t>
+            </a:r>
+          </a:p>
+        </p:txBody>
+      </p:sp>
+      <p:sp>
+        <p:nvSpPr>
+          <p:cNvPr id="3" name="Oval 2">
+            <a:extLst>
+              <a:ext uri="{FF2B5EF4-FFF2-40B4-BE49-F238E27FC236}">
+                <a16:creationId xmlns:a16="http://schemas.microsoft.com/office/drawing/2014/main" id="{9D8FC5E6-D745-B049-CF17-7EC6C748AF18}"/>
+              </a:ext>
+            </a:extLst>
+          </p:cNvPr>
+          <p:cNvSpPr/>
+          <p:nvPr/>
+        </p:nvSpPr>
+        <p:spPr>
+          <a:xfrm>
+            <a:off x="439695" y="4751136"/>
+            <a:ext cx="202032" cy="224597"/>
+          </a:xfrm>
+          <a:prstGeom prst="ellipse">
+            <a:avLst/>
+          </a:prstGeom>
+          <a:solidFill>
+            <a:schemeClr val="accent1"/>
+          </a:solidFill>
+          <a:ln>
+            <a:noFill/>
+          </a:ln>
+          <a:effectLst>
+            <a:outerShdw blurRad="107950" dist="12700" dir="5400000" algn="ctr">
+              <a:srgbClr val="000000"/>
+            </a:outerShdw>
+          </a:effectLst>
+          <a:scene3d>
+            <a:camera prst="orthographicFront">
+              <a:rot lat="0" lon="0" rev="0"/>
+            </a:camera>
+            <a:lightRig rig="soft" dir="t">
+              <a:rot lat="0" lon="0" rev="0"/>
+            </a:lightRig>
+          </a:scene3d>
+          <a:sp3d contourW="44450" prstMaterial="matte">
+            <a:bevelT w="63500" h="63500" prst="artDeco"/>
+            <a:contourClr>
+              <a:srgbClr val="FFFFFF"/>
+            </a:contourClr>
+          </a:sp3d>
+        </p:spPr>
+        <p:style>
+          <a:lnRef idx="2">
+            <a:schemeClr val="dk1">
+              <a:shade val="50000"/>
+            </a:schemeClr>
+          </a:lnRef>
+          <a:fillRef idx="1">
+            <a:schemeClr val="dk1"/>
+          </a:fillRef>
+          <a:effectRef idx="0">
+            <a:schemeClr val="dk1"/>
+          </a:effectRef>
+          <a:fontRef idx="minor">
+            <a:schemeClr val="lt1"/>
+          </a:fontRef>
+        </p:style>
+        <p:txBody>
+          <a:bodyPr rtlCol="0" anchor="ctr"/>
+          <a:lstStyle/>
+          <a:p>
+            <a:pPr algn="ctr"/>
+            <a:endParaRPr lang="en-US"/>
+          </a:p>
+        </p:txBody>
+      </p:sp>
+      <p:sp>
+        <p:nvSpPr>
+          <p:cNvPr id="5" name="TextBox 4">
+            <a:extLst>
+              <a:ext uri="{FF2B5EF4-FFF2-40B4-BE49-F238E27FC236}">
+                <a16:creationId xmlns:a16="http://schemas.microsoft.com/office/drawing/2014/main" id="{ECD4C78D-4CF4-B354-E144-5B13A6BBEE76}"/>
+              </a:ext>
+            </a:extLst>
+          </p:cNvPr>
+          <p:cNvSpPr txBox="1"/>
+          <p:nvPr/>
+        </p:nvSpPr>
+        <p:spPr>
+          <a:xfrm>
+            <a:off x="681843" y="4576689"/>
+            <a:ext cx="4972836" cy="523220"/>
+          </a:xfrm>
+          <a:prstGeom prst="rect">
+            <a:avLst/>
+          </a:prstGeom>
+          <a:noFill/>
+        </p:spPr>
+        <p:txBody>
+          <a:bodyPr wrap="none" rtlCol="0">
+            <a:spAutoFit/>
+          </a:bodyPr>
+          <a:lstStyle/>
+          <a:p>
+            <a:r>
+              <a:rPr lang="en-US" sz="2800" dirty="0">
+                <a:solidFill>
+                  <a:schemeClr val="bg2">
+                    <a:lumMod val="25000"/>
+                  </a:schemeClr>
+                </a:solidFill>
+                <a:latin typeface="Bahnschrift Light SemiCondensed" panose="020B0502040204020203" pitchFamily="34" charset="0"/>
+              </a:rPr>
+              <a:t>Most affected People Age , Gender</a:t>
+            </a:r>
           </a:p>
         </p:txBody>
       </p:sp>
       <p:pic>
         <p:nvPicPr>
-          <p:cNvPr id="6" name="Picture 5">
-            <a:extLst>
-              <a:ext uri="{FF2B5EF4-FFF2-40B4-BE49-F238E27FC236}">
-                <a16:creationId xmlns:a16="http://schemas.microsoft.com/office/drawing/2014/main" id="{EF9B36AB-42F8-1B12-CE70-8243FF58FD69}"/>
+          <p:cNvPr id="1026" name="Picture 2" descr="Physical Security Equipment to Prevent An Active Shooter">
+            <a:extLst>
+              <a:ext uri="{FF2B5EF4-FFF2-40B4-BE49-F238E27FC236}">
+                <a16:creationId xmlns:a16="http://schemas.microsoft.com/office/drawing/2014/main" id="{A23229C7-182D-DCCE-401F-BF43C931ABA9}"/>
               </a:ext>
             </a:extLst>
           </p:cNvPr>
           <p:cNvPicPr>
-            <a:picLocks noChangeAspect="1"/>
+            <a:picLocks noChangeAspect="1" noChangeArrowheads="1"/>
           </p:cNvPicPr>
           <p:nvPr/>
         </p:nvPicPr>
         <p:blipFill>
-          <a:blip r:embed="rId2"/>
+          <a:blip r:embed="rId3">
+            <a:extLst>
+              <a:ext uri="{28A0092B-C50C-407E-A947-70E740481C1C}">
+                <a14:useLocalDpi xmlns:a14="http://schemas.microsoft.com/office/drawing/2010/main" val="0"/>
+              </a:ext>
+            </a:extLst>
+          </a:blip>
+          <a:srcRect/>
           <a:stretch>
             <a:fillRect/>
           </a:stretch>
         </p:blipFill>
-        <p:spPr>
+        <p:spPr bwMode="auto">
           <a:xfrm>
-            <a:off x="0" y="1673"/>
-            <a:ext cx="12192000" cy="6854653"/>
+            <a:off x="7798197" y="1443324"/>
+            <a:ext cx="3831175" cy="3831175"/>
           </a:xfrm>
           <a:prstGeom prst="rect">
             <a:avLst/>
           </a:prstGeom>
+          <a:noFill/>
+          <a:extLst>
+            <a:ext uri="{909E8E84-426E-40DD-AFC4-6F175D3DCCD1}">
+              <a14:hiddenFill xmlns:a14="http://schemas.microsoft.com/office/drawing/2010/main">
+                <a:solidFill>
+                  <a:srgbClr val="FFFFFF"/>
+                </a:solidFill>
+              </a14:hiddenFill>
+            </a:ext>
+          </a:extLst>
         </p:spPr>
       </p:pic>
+      <p:sp>
+        <p:nvSpPr>
+          <p:cNvPr id="6" name="TextBox 5">
+            <a:extLst>
+              <a:ext uri="{FF2B5EF4-FFF2-40B4-BE49-F238E27FC236}">
+                <a16:creationId xmlns:a16="http://schemas.microsoft.com/office/drawing/2014/main" id="{A8BD434E-D1AE-AD2C-5C3A-912B7055C249}"/>
+              </a:ext>
+            </a:extLst>
+          </p:cNvPr>
+          <p:cNvSpPr txBox="1"/>
+          <p:nvPr/>
+        </p:nvSpPr>
+        <p:spPr>
+          <a:xfrm>
+            <a:off x="678637" y="5254217"/>
+            <a:ext cx="6683240" cy="523220"/>
+          </a:xfrm>
+          <a:prstGeom prst="rect">
+            <a:avLst/>
+          </a:prstGeom>
+          <a:noFill/>
+        </p:spPr>
+        <p:txBody>
+          <a:bodyPr wrap="none" rtlCol="0">
+            <a:spAutoFit/>
+          </a:bodyPr>
+          <a:lstStyle/>
+          <a:p>
+            <a:r>
+              <a:rPr lang="en-US" sz="2800" dirty="0">
+                <a:solidFill>
+                  <a:schemeClr val="bg2">
+                    <a:lumMod val="25000"/>
+                  </a:schemeClr>
+                </a:solidFill>
+                <a:latin typeface="Bahnschrift Light SemiCondensed" panose="020B0502040204020203" pitchFamily="34" charset="0"/>
+              </a:rPr>
+              <a:t>Admin Backend effective management of data </a:t>
+            </a:r>
+          </a:p>
+        </p:txBody>
+      </p:sp>
+      <p:sp>
+        <p:nvSpPr>
+          <p:cNvPr id="8" name="Oval 7">
+            <a:extLst>
+              <a:ext uri="{FF2B5EF4-FFF2-40B4-BE49-F238E27FC236}">
+                <a16:creationId xmlns:a16="http://schemas.microsoft.com/office/drawing/2014/main" id="{9E97F96D-D407-F55D-2682-0741907B8D02}"/>
+              </a:ext>
+            </a:extLst>
+          </p:cNvPr>
+          <p:cNvSpPr/>
+          <p:nvPr/>
+        </p:nvSpPr>
+        <p:spPr>
+          <a:xfrm>
+            <a:off x="419860" y="5447859"/>
+            <a:ext cx="202032" cy="224597"/>
+          </a:xfrm>
+          <a:prstGeom prst="ellipse">
+            <a:avLst/>
+          </a:prstGeom>
+          <a:solidFill>
+            <a:schemeClr val="accent1"/>
+          </a:solidFill>
+          <a:ln>
+            <a:noFill/>
+          </a:ln>
+          <a:effectLst>
+            <a:outerShdw blurRad="107950" dist="12700" dir="5400000" algn="ctr">
+              <a:srgbClr val="000000"/>
+            </a:outerShdw>
+          </a:effectLst>
+          <a:scene3d>
+            <a:camera prst="orthographicFront">
+              <a:rot lat="0" lon="0" rev="0"/>
+            </a:camera>
+            <a:lightRig rig="soft" dir="t">
+              <a:rot lat="0" lon="0" rev="0"/>
+            </a:lightRig>
+          </a:scene3d>
+          <a:sp3d contourW="44450" prstMaterial="matte">
+            <a:bevelT w="63500" h="63500" prst="artDeco"/>
+            <a:contourClr>
+              <a:srgbClr val="FFFFFF"/>
+            </a:contourClr>
+          </a:sp3d>
+        </p:spPr>
+        <p:style>
+          <a:lnRef idx="2">
+            <a:schemeClr val="dk1">
+              <a:shade val="50000"/>
+            </a:schemeClr>
+          </a:lnRef>
+          <a:fillRef idx="1">
+            <a:schemeClr val="dk1"/>
+          </a:fillRef>
+          <a:effectRef idx="0">
+            <a:schemeClr val="dk1"/>
+          </a:effectRef>
+          <a:fontRef idx="minor">
+            <a:schemeClr val="lt1"/>
+          </a:fontRef>
+        </p:style>
+        <p:txBody>
+          <a:bodyPr rtlCol="0" anchor="ctr"/>
+          <a:lstStyle/>
+          <a:p>
+            <a:pPr algn="ctr"/>
+            <a:endParaRPr lang="en-US"/>
+          </a:p>
+        </p:txBody>
+      </p:sp>
     </p:spTree>
     <p:extLst>
       <p:ext uri="{BB962C8B-B14F-4D97-AF65-F5344CB8AC3E}">
-        <p14:creationId xmlns:p14="http://schemas.microsoft.com/office/powerpoint/2010/main" val="2518949505"/>
+        <p14:creationId xmlns:p14="http://schemas.microsoft.com/office/powerpoint/2010/main" val="2372968877"/>
       </p:ext>
     </p:extLst>
   </p:cSld>
   <p:clrMapOvr>
     <a:masterClrMapping/>
   </p:clrMapOvr>
+  <mc:AlternateContent xmlns:mc="http://schemas.openxmlformats.org/markup-compatibility/2006" xmlns:p14="http://schemas.microsoft.com/office/powerpoint/2010/main">
+    <mc:Choice Requires="p14">
+      <p:transition spd="med" p14:dur="700">
+        <p:fade/>
+      </p:transition>
+    </mc:Choice>
+    <mc:Fallback xmlns="">
+      <p:transition spd="med">
+        <p:fade/>
+      </p:transition>
+    </mc:Fallback>
+  </mc:AlternateContent>
 </p:sld>
 </file>
 
@@ -4962,7 +5776,7 @@
                   <a:schemeClr val="bg1"/>
                 </a:solidFill>
               </a:rPr>
-              <a:t>Dundalk Institute Of Technology</a:t>
+              <a:t>Dundalk Institute of Technology</a:t>
             </a:r>
           </a:p>
         </p:txBody>
@@ -5576,7 +6390,7 @@
                   <a:schemeClr val="bg1"/>
                 </a:solidFill>
               </a:rPr>
-              <a:t>Dundalk Institute Of Technology</a:t>
+              <a:t>Dundalk Institute of Technology</a:t>
             </a:r>
           </a:p>
         </p:txBody>
@@ -6385,7 +7199,7 @@
         <p:spPr>
           <a:xfrm>
             <a:off x="482600" y="3346229"/>
-            <a:ext cx="4450257" cy="954107"/>
+            <a:ext cx="2824812" cy="954107"/>
           </a:xfrm>
           <a:prstGeom prst="rect">
             <a:avLst/>
@@ -6407,7 +7221,7 @@
                 </a:solidFill>
                 <a:latin typeface="Bahnschrift Light SemiCondensed" panose="020B0502040204020203" pitchFamily="34" charset="0"/>
               </a:rPr>
-              <a:t>3. Data Storage and Protection</a:t>
+              <a:t>3. Previous studies</a:t>
             </a:r>
           </a:p>
           <a:p>
@@ -6493,18 +7307,13 @@
           <a:lstStyle/>
           <a:p>
             <a:r>
-              <a:rPr lang="en-US">
+              <a:rPr lang="en-US" dirty="0">
                 <a:solidFill>
                   <a:schemeClr val="bg1"/>
                 </a:solidFill>
               </a:rPr>
-              <a:t>Dundalk Institute Of Technology</a:t>
-            </a:r>
-            <a:endParaRPr lang="en-US" dirty="0">
-              <a:solidFill>
-                <a:schemeClr val="bg1"/>
-              </a:solidFill>
-            </a:endParaRPr>
+              <a:t>Dundalk Institute of Technology</a:t>
+            </a:r>
           </a:p>
         </p:txBody>
       </p:sp>
@@ -7527,7 +8336,7 @@
                   <a:schemeClr val="bg1"/>
                 </a:solidFill>
               </a:rPr>
-              <a:t>Dundalk Institute Of Technology</a:t>
+              <a:t>Dundalk Institute of Technology</a:t>
             </a:r>
           </a:p>
         </p:txBody>
@@ -7908,7 +8717,7 @@
                   <a:schemeClr val="bg1"/>
                 </a:solidFill>
               </a:rPr>
-              <a:t>Dundalk Institute Of Technology</a:t>
+              <a:t>Dundalk Institute of Technology</a:t>
             </a:r>
           </a:p>
         </p:txBody>
@@ -7970,7 +8779,7 @@
         <p:spPr>
           <a:xfrm>
             <a:off x="482600" y="2428567"/>
-            <a:ext cx="5110694" cy="523220"/>
+            <a:ext cx="4673074" cy="523220"/>
           </a:xfrm>
           <a:prstGeom prst="rect">
             <a:avLst/>
@@ -7992,7 +8801,7 @@
                 </a:solidFill>
                 <a:latin typeface="Bahnschrift Light SemiCondensed" panose="020B0502040204020203" pitchFamily="34" charset="0"/>
               </a:rPr>
-              <a:t>2. MySQL Data Architecture (DBMS)</a:t>
+              <a:t>2. MySQL Database Architecture</a:t>
             </a:r>
           </a:p>
         </p:txBody>
@@ -8054,7 +8863,7 @@
         <p:spPr>
           <a:xfrm>
             <a:off x="482599" y="3490819"/>
-            <a:ext cx="5261377" cy="523220"/>
+            <a:ext cx="6668813" cy="523220"/>
           </a:xfrm>
           <a:prstGeom prst="rect">
             <a:avLst/>
@@ -8076,7 +8885,7 @@
                 </a:solidFill>
                 <a:latin typeface="Bahnschrift Light SemiCondensed" panose="020B0502040204020203" pitchFamily="34" charset="0"/>
               </a:rPr>
-              <a:t>4. Python Dash for live visualization</a:t>
+              <a:t>4. Python Dash with CSS for Dashboard design</a:t>
             </a:r>
           </a:p>
         </p:txBody>
@@ -8096,7 +8905,7 @@
         <p:spPr>
           <a:xfrm>
             <a:off x="482598" y="4057261"/>
-            <a:ext cx="6171882" cy="523220"/>
+            <a:ext cx="6237605" cy="523220"/>
           </a:xfrm>
           <a:prstGeom prst="rect">
             <a:avLst/>
@@ -8118,7 +8927,7 @@
                 </a:solidFill>
                 <a:latin typeface="Bahnschrift Light SemiCondensed" panose="020B0502040204020203" pitchFamily="34" charset="0"/>
               </a:rPr>
-              <a:t>5. Git repos and hosting on Remote Server </a:t>
+              <a:t>5. Git Repos and hosting on Remote Server </a:t>
             </a:r>
           </a:p>
         </p:txBody>
@@ -8165,36 +8974,6 @@
           </a:p>
         </p:txBody>
       </p:sp>
-      <p:pic>
-        <p:nvPicPr>
-          <p:cNvPr id="3" name="Picture 2" descr="Diagram&#10;&#10;Description automatically generated">
-            <a:extLst>
-              <a:ext uri="{FF2B5EF4-FFF2-40B4-BE49-F238E27FC236}">
-                <a16:creationId xmlns:a16="http://schemas.microsoft.com/office/drawing/2014/main" id="{A14FB6FE-E543-42E6-A9BF-AF509D5A44A8}"/>
-              </a:ext>
-            </a:extLst>
-          </p:cNvPr>
-          <p:cNvPicPr>
-            <a:picLocks noChangeAspect="1"/>
-          </p:cNvPicPr>
-          <p:nvPr/>
-        </p:nvPicPr>
-        <p:blipFill>
-          <a:blip r:embed="rId3"/>
-          <a:stretch>
-            <a:fillRect/>
-          </a:stretch>
-        </p:blipFill>
-        <p:spPr>
-          <a:xfrm>
-            <a:off x="7403370" y="2287231"/>
-            <a:ext cx="4074160" cy="1983005"/>
-          </a:xfrm>
-          <a:prstGeom prst="rect">
-            <a:avLst/>
-          </a:prstGeom>
-        </p:spPr>
-      </p:pic>
       <p:sp>
         <p:nvSpPr>
           <p:cNvPr id="6" name="TextBox 5">
@@ -8237,6 +9016,53 @@
           </a:p>
         </p:txBody>
       </p:sp>
+      <p:pic>
+        <p:nvPicPr>
+          <p:cNvPr id="2050" name="Picture 2" descr="Chapter 1 - Introduction to CRISP DM Framework for Data Science and Machine  Learning">
+            <a:extLst>
+              <a:ext uri="{FF2B5EF4-FFF2-40B4-BE49-F238E27FC236}">
+                <a16:creationId xmlns:a16="http://schemas.microsoft.com/office/drawing/2014/main" id="{00393C65-246A-B37A-4AA4-017EC779C226}"/>
+              </a:ext>
+            </a:extLst>
+          </p:cNvPr>
+          <p:cNvPicPr>
+            <a:picLocks noChangeAspect="1" noChangeArrowheads="1"/>
+          </p:cNvPicPr>
+          <p:nvPr/>
+        </p:nvPicPr>
+        <p:blipFill>
+          <a:blip r:embed="rId3">
+            <a:extLst>
+              <a:ext uri="{28A0092B-C50C-407E-A947-70E740481C1C}">
+                <a14:useLocalDpi xmlns:a14="http://schemas.microsoft.com/office/drawing/2010/main" val="0"/>
+              </a:ext>
+            </a:extLst>
+          </a:blip>
+          <a:srcRect/>
+          <a:stretch>
+            <a:fillRect/>
+          </a:stretch>
+        </p:blipFill>
+        <p:spPr bwMode="auto">
+          <a:xfrm>
+            <a:off x="7624176" y="1768413"/>
+            <a:ext cx="3719513" cy="3429000"/>
+          </a:xfrm>
+          <a:prstGeom prst="rect">
+            <a:avLst/>
+          </a:prstGeom>
+          <a:noFill/>
+          <a:extLst>
+            <a:ext uri="{909E8E84-426E-40DD-AFC4-6F175D3DCCD1}">
+              <a14:hiddenFill xmlns:a14="http://schemas.microsoft.com/office/drawing/2010/main">
+                <a:solidFill>
+                  <a:srgbClr val="FFFFFF"/>
+                </a:solidFill>
+              </a14:hiddenFill>
+            </a:ext>
+          </a:extLst>
+        </p:spPr>
+      </p:pic>
     </p:spTree>
     <p:extLst>
       <p:ext uri="{BB962C8B-B14F-4D97-AF65-F5344CB8AC3E}">
@@ -8265,6 +9091,95 @@
 <file path=ppt/slides/slide6.xml><?xml version="1.0" encoding="utf-8"?>
 <p:sld xmlns:a="http://schemas.openxmlformats.org/drawingml/2006/main" xmlns:r="http://schemas.openxmlformats.org/officeDocument/2006/relationships" xmlns:p="http://schemas.openxmlformats.org/presentationml/2006/main">
   <p:cSld>
+    <p:spTree>
+      <p:nvGrpSpPr>
+        <p:cNvPr id="1" name=""/>
+        <p:cNvGrpSpPr/>
+        <p:nvPr/>
+      </p:nvGrpSpPr>
+      <p:grpSpPr>
+        <a:xfrm>
+          <a:off x="0" y="0"/>
+          <a:ext cx="0" cy="0"/>
+          <a:chOff x="0" y="0"/>
+          <a:chExt cx="0" cy="0"/>
+        </a:xfrm>
+      </p:grpSpPr>
+      <p:sp>
+        <p:nvSpPr>
+          <p:cNvPr id="4" name="Footer Placeholder 3">
+            <a:extLst>
+              <a:ext uri="{FF2B5EF4-FFF2-40B4-BE49-F238E27FC236}">
+                <a16:creationId xmlns:a16="http://schemas.microsoft.com/office/drawing/2014/main" id="{1D722364-C12C-B2D6-D0A8-2C6FB906CE59}"/>
+              </a:ext>
+            </a:extLst>
+          </p:cNvPr>
+          <p:cNvSpPr>
+            <a:spLocks noGrp="1"/>
+          </p:cNvSpPr>
+          <p:nvPr>
+            <p:ph type="ftr" sz="quarter" idx="11"/>
+          </p:nvPr>
+        </p:nvSpPr>
+        <p:spPr/>
+        <p:txBody>
+          <a:bodyPr/>
+          <a:lstStyle/>
+          <a:p>
+            <a:r>
+              <a:rPr lang="en-US"/>
+              <a:t>Dundalk Institute Of Technology</a:t>
+            </a:r>
+            <a:endParaRPr lang="en-US" dirty="0"/>
+          </a:p>
+        </p:txBody>
+      </p:sp>
+      <p:pic>
+        <p:nvPicPr>
+          <p:cNvPr id="6" name="Picture 5">
+            <a:extLst>
+              <a:ext uri="{FF2B5EF4-FFF2-40B4-BE49-F238E27FC236}">
+                <a16:creationId xmlns:a16="http://schemas.microsoft.com/office/drawing/2014/main" id="{F6F47EE1-AEAF-E92B-3B30-94FF42982033}"/>
+              </a:ext>
+            </a:extLst>
+          </p:cNvPr>
+          <p:cNvPicPr>
+            <a:picLocks noChangeAspect="1"/>
+          </p:cNvPicPr>
+          <p:nvPr/>
+        </p:nvPicPr>
+        <p:blipFill>
+          <a:blip r:embed="rId2"/>
+          <a:stretch>
+            <a:fillRect/>
+          </a:stretch>
+        </p:blipFill>
+        <p:spPr>
+          <a:xfrm>
+            <a:off x="0" y="1673"/>
+            <a:ext cx="12192000" cy="6854653"/>
+          </a:xfrm>
+          <a:prstGeom prst="rect">
+            <a:avLst/>
+          </a:prstGeom>
+        </p:spPr>
+      </p:pic>
+    </p:spTree>
+    <p:extLst>
+      <p:ext uri="{BB962C8B-B14F-4D97-AF65-F5344CB8AC3E}">
+        <p14:creationId xmlns:p14="http://schemas.microsoft.com/office/powerpoint/2010/main" val="1747825618"/>
+      </p:ext>
+    </p:extLst>
+  </p:cSld>
+  <p:clrMapOvr>
+    <a:masterClrMapping/>
+  </p:clrMapOvr>
+</p:sld>
+</file>
+
+<file path=ppt/slides/slide7.xml><?xml version="1.0" encoding="utf-8"?>
+<p:sld xmlns:a="http://schemas.openxmlformats.org/drawingml/2006/main" xmlns:r="http://schemas.openxmlformats.org/officeDocument/2006/relationships" xmlns:p="http://schemas.openxmlformats.org/presentationml/2006/main">
+  <p:cSld>
     <p:bg>
       <p:bgPr>
         <a:solidFill>
@@ -8289,56 +9204,10 @@
       </p:grpSpPr>
       <p:sp>
         <p:nvSpPr>
-          <p:cNvPr id="4" name="Rectangle 3">
-            <a:extLst>
-              <a:ext uri="{FF2B5EF4-FFF2-40B4-BE49-F238E27FC236}">
-                <a16:creationId xmlns:a16="http://schemas.microsoft.com/office/drawing/2014/main" id="{6CCB6BD9-4D69-4662-86E5-9D71EF9B662B}"/>
-              </a:ext>
-            </a:extLst>
-          </p:cNvPr>
-          <p:cNvSpPr/>
-          <p:nvPr/>
-        </p:nvSpPr>
-        <p:spPr>
-          <a:xfrm>
-            <a:off x="0" y="6202042"/>
-            <a:ext cx="12192000" cy="655958"/>
-          </a:xfrm>
-          <a:prstGeom prst="rect">
-            <a:avLst/>
-          </a:prstGeom>
-        </p:spPr>
-        <p:style>
-          <a:lnRef idx="2">
-            <a:schemeClr val="accent1">
-              <a:shade val="50000"/>
-            </a:schemeClr>
-          </a:lnRef>
-          <a:fillRef idx="1">
-            <a:schemeClr val="accent1"/>
-          </a:fillRef>
-          <a:effectRef idx="0">
-            <a:schemeClr val="accent1"/>
-          </a:effectRef>
-          <a:fontRef idx="minor">
-            <a:schemeClr val="lt1"/>
-          </a:fontRef>
-        </p:style>
-        <p:txBody>
-          <a:bodyPr rtlCol="0" anchor="ctr"/>
-          <a:lstStyle/>
-          <a:p>
-            <a:pPr algn="ctr"/>
-            <a:endParaRPr lang="en-US"/>
-          </a:p>
-        </p:txBody>
-      </p:sp>
-      <p:sp>
-        <p:nvSpPr>
-          <p:cNvPr id="2" name="Footer Placeholder 1">
-            <a:extLst>
-              <a:ext uri="{FF2B5EF4-FFF2-40B4-BE49-F238E27FC236}">
-                <a16:creationId xmlns:a16="http://schemas.microsoft.com/office/drawing/2014/main" id="{1F982B3B-45C9-4A30-99FB-7BA28997ECFD}"/>
+          <p:cNvPr id="4" name="Footer Placeholder 3">
+            <a:extLst>
+              <a:ext uri="{FF2B5EF4-FFF2-40B4-BE49-F238E27FC236}">
+                <a16:creationId xmlns:a16="http://schemas.microsoft.com/office/drawing/2014/main" id="{AD883D52-986F-3C37-9183-03AA57B120DB}"/>
               </a:ext>
             </a:extLst>
           </p:cNvPr>
@@ -8351,766 +9220,38 @@
         </p:nvSpPr>
         <p:spPr/>
         <p:txBody>
-          <a:bodyPr/>
-          <a:lstStyle/>
-          <a:p>
-            <a:r>
-              <a:rPr lang="en-US" dirty="0">
+          <a:bodyPr vert="horz" lIns="91440" tIns="45720" rIns="91440" bIns="45720" rtlCol="0" anchor="ctr">
+            <a:normAutofit/>
+          </a:bodyPr>
+          <a:lstStyle/>
+          <a:p>
+            <a:pPr>
+              <a:spcAft>
+                <a:spcPts val="600"/>
+              </a:spcAft>
+            </a:pPr>
+            <a:r>
+              <a:rPr lang="en-US" kern="1200">
                 <a:solidFill>
-                  <a:schemeClr val="bg1"/>
+                  <a:schemeClr val="tx1">
+                    <a:tint val="75000"/>
+                  </a:schemeClr>
                 </a:solidFill>
+                <a:latin typeface="+mn-lt"/>
+                <a:ea typeface="+mn-ea"/>
+                <a:cs typeface="+mn-cs"/>
               </a:rPr>
               <a:t>Dundalk Institute Of Technology</a:t>
             </a:r>
           </a:p>
         </p:txBody>
       </p:sp>
-      <p:sp>
-        <p:nvSpPr>
-          <p:cNvPr id="7" name="TextBox 6">
-            <a:extLst>
-              <a:ext uri="{FF2B5EF4-FFF2-40B4-BE49-F238E27FC236}">
-                <a16:creationId xmlns:a16="http://schemas.microsoft.com/office/drawing/2014/main" id="{4D8669B1-5C46-40FC-89AC-B36E5234A04C}"/>
-              </a:ext>
-            </a:extLst>
-          </p:cNvPr>
-          <p:cNvSpPr txBox="1"/>
-          <p:nvPr/>
-        </p:nvSpPr>
-        <p:spPr>
-          <a:xfrm>
-            <a:off x="1619534" y="343646"/>
-            <a:ext cx="8952931" cy="830997"/>
-          </a:xfrm>
-          <a:prstGeom prst="rect">
-            <a:avLst/>
-          </a:prstGeom>
-          <a:noFill/>
-        </p:spPr>
-        <p:txBody>
-          <a:bodyPr wrap="square">
-            <a:spAutoFit/>
-          </a:bodyPr>
-          <a:lstStyle/>
-          <a:p>
-            <a:pPr algn="ctr"/>
-            <a:r>
-              <a:rPr lang="en-US" sz="4800" b="1" dirty="0">
-                <a:solidFill>
-                  <a:schemeClr val="accent5">
-                    <a:lumMod val="50000"/>
-                  </a:schemeClr>
-                </a:solidFill>
-                <a:effectLst>
-                  <a:outerShdw blurRad="38100" dist="38100" dir="2700000" algn="tl">
-                    <a:srgbClr val="000000">
-                      <a:alpha val="43137"/>
-                    </a:srgbClr>
-                  </a:outerShdw>
-                </a:effectLst>
-                <a:latin typeface="Bahnschrift Light SemiCondensed" panose="020B0502040204020203" pitchFamily="34" charset="0"/>
-              </a:rPr>
-              <a:t>Conclusion</a:t>
-            </a:r>
-          </a:p>
-        </p:txBody>
-      </p:sp>
-      <p:sp>
-        <p:nvSpPr>
-          <p:cNvPr id="16" name="Oval 15">
-            <a:extLst>
-              <a:ext uri="{FF2B5EF4-FFF2-40B4-BE49-F238E27FC236}">
-                <a16:creationId xmlns:a16="http://schemas.microsoft.com/office/drawing/2014/main" id="{3E8EA68D-AAC2-4BD2-957A-236B86BAA6C2}"/>
-              </a:ext>
-            </a:extLst>
-          </p:cNvPr>
-          <p:cNvSpPr/>
-          <p:nvPr/>
-        </p:nvSpPr>
-        <p:spPr>
-          <a:xfrm>
-            <a:off x="419860" y="2925359"/>
-            <a:ext cx="202032" cy="224597"/>
-          </a:xfrm>
-          <a:prstGeom prst="ellipse">
-            <a:avLst/>
-          </a:prstGeom>
-          <a:solidFill>
-            <a:schemeClr val="accent1"/>
-          </a:solidFill>
-          <a:ln>
-            <a:noFill/>
-          </a:ln>
-          <a:effectLst>
-            <a:outerShdw blurRad="107950" dist="12700" dir="5400000" algn="ctr">
-              <a:srgbClr val="000000"/>
-            </a:outerShdw>
-          </a:effectLst>
-          <a:scene3d>
-            <a:camera prst="orthographicFront">
-              <a:rot lat="0" lon="0" rev="0"/>
-            </a:camera>
-            <a:lightRig rig="soft" dir="t">
-              <a:rot lat="0" lon="0" rev="0"/>
-            </a:lightRig>
-          </a:scene3d>
-          <a:sp3d contourW="44450" prstMaterial="matte">
-            <a:bevelT w="63500" h="63500" prst="artDeco"/>
-            <a:contourClr>
-              <a:srgbClr val="FFFFFF"/>
-            </a:contourClr>
-          </a:sp3d>
-        </p:spPr>
-        <p:style>
-          <a:lnRef idx="2">
-            <a:schemeClr val="dk1">
-              <a:shade val="50000"/>
-            </a:schemeClr>
-          </a:lnRef>
-          <a:fillRef idx="1">
-            <a:schemeClr val="dk1"/>
-          </a:fillRef>
-          <a:effectRef idx="0">
-            <a:schemeClr val="dk1"/>
-          </a:effectRef>
-          <a:fontRef idx="minor">
-            <a:schemeClr val="lt1"/>
-          </a:fontRef>
-        </p:style>
-        <p:txBody>
-          <a:bodyPr rtlCol="0" anchor="ctr"/>
-          <a:lstStyle/>
-          <a:p>
-            <a:pPr algn="ctr"/>
-            <a:endParaRPr lang="en-US"/>
-          </a:p>
-        </p:txBody>
-      </p:sp>
-      <p:sp>
-        <p:nvSpPr>
-          <p:cNvPr id="17" name="Oval 16">
-            <a:extLst>
-              <a:ext uri="{FF2B5EF4-FFF2-40B4-BE49-F238E27FC236}">
-                <a16:creationId xmlns:a16="http://schemas.microsoft.com/office/drawing/2014/main" id="{7D0B9510-9AE9-4398-8334-5101C156021E}"/>
-              </a:ext>
-            </a:extLst>
-          </p:cNvPr>
-          <p:cNvSpPr/>
-          <p:nvPr/>
-        </p:nvSpPr>
-        <p:spPr>
-          <a:xfrm>
-            <a:off x="419860" y="3524828"/>
-            <a:ext cx="202032" cy="224597"/>
-          </a:xfrm>
-          <a:prstGeom prst="ellipse">
-            <a:avLst/>
-          </a:prstGeom>
-          <a:solidFill>
-            <a:schemeClr val="accent1"/>
-          </a:solidFill>
-          <a:ln>
-            <a:noFill/>
-          </a:ln>
-          <a:effectLst>
-            <a:outerShdw blurRad="107950" dist="12700" dir="5400000" algn="ctr">
-              <a:srgbClr val="000000"/>
-            </a:outerShdw>
-          </a:effectLst>
-          <a:scene3d>
-            <a:camera prst="orthographicFront">
-              <a:rot lat="0" lon="0" rev="0"/>
-            </a:camera>
-            <a:lightRig rig="soft" dir="t">
-              <a:rot lat="0" lon="0" rev="0"/>
-            </a:lightRig>
-          </a:scene3d>
-          <a:sp3d contourW="44450" prstMaterial="matte">
-            <a:bevelT w="63500" h="63500" prst="artDeco"/>
-            <a:contourClr>
-              <a:srgbClr val="FFFFFF"/>
-            </a:contourClr>
-          </a:sp3d>
-        </p:spPr>
-        <p:style>
-          <a:lnRef idx="2">
-            <a:schemeClr val="dk1">
-              <a:shade val="50000"/>
-            </a:schemeClr>
-          </a:lnRef>
-          <a:fillRef idx="1">
-            <a:schemeClr val="dk1"/>
-          </a:fillRef>
-          <a:effectRef idx="0">
-            <a:schemeClr val="dk1"/>
-          </a:effectRef>
-          <a:fontRef idx="minor">
-            <a:schemeClr val="lt1"/>
-          </a:fontRef>
-        </p:style>
-        <p:txBody>
-          <a:bodyPr rtlCol="0" anchor="ctr"/>
-          <a:lstStyle/>
-          <a:p>
-            <a:pPr algn="ctr"/>
-            <a:endParaRPr lang="en-US"/>
-          </a:p>
-        </p:txBody>
-      </p:sp>
-      <p:sp>
-        <p:nvSpPr>
-          <p:cNvPr id="19" name="TextBox 18">
-            <a:extLst>
-              <a:ext uri="{FF2B5EF4-FFF2-40B4-BE49-F238E27FC236}">
-                <a16:creationId xmlns:a16="http://schemas.microsoft.com/office/drawing/2014/main" id="{6996685C-75E3-4E35-834F-1264055670BE}"/>
-              </a:ext>
-            </a:extLst>
-          </p:cNvPr>
-          <p:cNvSpPr txBox="1"/>
-          <p:nvPr/>
-        </p:nvSpPr>
-        <p:spPr>
-          <a:xfrm>
-            <a:off x="686559" y="2175673"/>
-            <a:ext cx="5388013" cy="523220"/>
-          </a:xfrm>
-          <a:prstGeom prst="rect">
-            <a:avLst/>
-          </a:prstGeom>
-          <a:noFill/>
-        </p:spPr>
-        <p:txBody>
-          <a:bodyPr wrap="none" rtlCol="0">
-            <a:spAutoFit/>
-          </a:bodyPr>
-          <a:lstStyle/>
-          <a:p>
-            <a:r>
-              <a:rPr lang="en-US" sz="2800" dirty="0">
-                <a:solidFill>
-                  <a:schemeClr val="bg2">
-                    <a:lumMod val="25000"/>
-                  </a:schemeClr>
-                </a:solidFill>
-                <a:latin typeface="Bahnschrift Light SemiCondensed" panose="020B0502040204020203" pitchFamily="34" charset="0"/>
-              </a:rPr>
-              <a:t>SARIMAX outperformed other models</a:t>
-            </a:r>
-          </a:p>
-        </p:txBody>
-      </p:sp>
-      <p:sp>
-        <p:nvSpPr>
-          <p:cNvPr id="21" name="TextBox 20">
-            <a:extLst>
-              <a:ext uri="{FF2B5EF4-FFF2-40B4-BE49-F238E27FC236}">
-                <a16:creationId xmlns:a16="http://schemas.microsoft.com/office/drawing/2014/main" id="{C7BF364A-D2A6-412E-8B5C-B18CE58B3D2E}"/>
-              </a:ext>
-            </a:extLst>
-          </p:cNvPr>
-          <p:cNvSpPr txBox="1"/>
-          <p:nvPr/>
-        </p:nvSpPr>
-        <p:spPr>
-          <a:xfrm>
-            <a:off x="681843" y="3358912"/>
-            <a:ext cx="3005951" cy="523220"/>
-          </a:xfrm>
-          <a:prstGeom prst="rect">
-            <a:avLst/>
-          </a:prstGeom>
-          <a:noFill/>
-        </p:spPr>
-        <p:txBody>
-          <a:bodyPr wrap="none" rtlCol="0">
-            <a:spAutoFit/>
-          </a:bodyPr>
-          <a:lstStyle/>
-          <a:p>
-            <a:r>
-              <a:rPr lang="en-US" sz="2800" dirty="0">
-                <a:solidFill>
-                  <a:schemeClr val="bg2">
-                    <a:lumMod val="25000"/>
-                  </a:schemeClr>
-                </a:solidFill>
-                <a:latin typeface="Bahnschrift Light SemiCondensed" panose="020B0502040204020203" pitchFamily="34" charset="0"/>
-              </a:rPr>
-              <a:t>Cron Jobs capability</a:t>
-            </a:r>
-          </a:p>
-        </p:txBody>
-      </p:sp>
-      <p:sp>
-        <p:nvSpPr>
-          <p:cNvPr id="25" name="Oval 24">
-            <a:extLst>
-              <a:ext uri="{FF2B5EF4-FFF2-40B4-BE49-F238E27FC236}">
-                <a16:creationId xmlns:a16="http://schemas.microsoft.com/office/drawing/2014/main" id="{B0A59C5C-C8F1-4172-A9BD-37120DDC0E11}"/>
-              </a:ext>
-            </a:extLst>
-          </p:cNvPr>
-          <p:cNvSpPr/>
-          <p:nvPr/>
-        </p:nvSpPr>
-        <p:spPr>
-          <a:xfrm>
-            <a:off x="419860" y="2328573"/>
-            <a:ext cx="202032" cy="224597"/>
-          </a:xfrm>
-          <a:prstGeom prst="ellipse">
-            <a:avLst/>
-          </a:prstGeom>
-          <a:solidFill>
-            <a:schemeClr val="accent1"/>
-          </a:solidFill>
-          <a:ln>
-            <a:noFill/>
-          </a:ln>
-          <a:effectLst>
-            <a:outerShdw blurRad="107950" dist="12700" dir="5400000" algn="ctr">
-              <a:srgbClr val="000000"/>
-            </a:outerShdw>
-          </a:effectLst>
-          <a:scene3d>
-            <a:camera prst="orthographicFront">
-              <a:rot lat="0" lon="0" rev="0"/>
-            </a:camera>
-            <a:lightRig rig="soft" dir="t">
-              <a:rot lat="0" lon="0" rev="0"/>
-            </a:lightRig>
-          </a:scene3d>
-          <a:sp3d contourW="44450" prstMaterial="matte">
-            <a:bevelT w="63500" h="63500" prst="artDeco"/>
-            <a:contourClr>
-              <a:srgbClr val="FFFFFF"/>
-            </a:contourClr>
-          </a:sp3d>
-        </p:spPr>
-        <p:style>
-          <a:lnRef idx="2">
-            <a:schemeClr val="dk1">
-              <a:shade val="50000"/>
-            </a:schemeClr>
-          </a:lnRef>
-          <a:fillRef idx="1">
-            <a:schemeClr val="dk1"/>
-          </a:fillRef>
-          <a:effectRef idx="0">
-            <a:schemeClr val="dk1"/>
-          </a:effectRef>
-          <a:fontRef idx="minor">
-            <a:schemeClr val="lt1"/>
-          </a:fontRef>
-        </p:style>
-        <p:txBody>
-          <a:bodyPr rtlCol="0" anchor="ctr"/>
-          <a:lstStyle/>
-          <a:p>
-            <a:pPr algn="ctr"/>
-            <a:endParaRPr lang="en-US"/>
-          </a:p>
-        </p:txBody>
-      </p:sp>
       <p:pic>
         <p:nvPicPr>
-          <p:cNvPr id="2050" name="Picture 2">
-            <a:extLst>
-              <a:ext uri="{FF2B5EF4-FFF2-40B4-BE49-F238E27FC236}">
-                <a16:creationId xmlns:a16="http://schemas.microsoft.com/office/drawing/2014/main" id="{47BB9719-CA60-4924-9354-4796BE36C7B5}"/>
-              </a:ext>
-            </a:extLst>
-          </p:cNvPr>
-          <p:cNvPicPr>
-            <a:picLocks noChangeAspect="1" noChangeArrowheads="1"/>
-          </p:cNvPicPr>
-          <p:nvPr/>
-        </p:nvPicPr>
-        <p:blipFill>
-          <a:blip r:embed="rId3">
-            <a:extLst>
-              <a:ext uri="{BEBA8EAE-BF5A-486C-A8C5-ECC9F3942E4B}">
-                <a14:imgProps xmlns:a14="http://schemas.microsoft.com/office/drawing/2010/main">
-                  <a14:imgLayer r:embed="rId4">
-                    <a14:imgEffect>
-                      <a14:saturation sat="400000"/>
-                    </a14:imgEffect>
-                  </a14:imgLayer>
-                </a14:imgProps>
-              </a:ext>
-              <a:ext uri="{28A0092B-C50C-407E-A947-70E740481C1C}">
-                <a14:useLocalDpi xmlns:a14="http://schemas.microsoft.com/office/drawing/2010/main" val="0"/>
-              </a:ext>
-            </a:extLst>
-          </a:blip>
-          <a:srcRect/>
-          <a:stretch/>
-        </p:blipFill>
-        <p:spPr bwMode="auto">
-          <a:xfrm>
-            <a:off x="7905203" y="1152542"/>
-            <a:ext cx="4108390" cy="4108390"/>
-          </a:xfrm>
-          <a:prstGeom prst="rect">
-            <a:avLst/>
-          </a:prstGeom>
-          <a:noFill/>
-          <a:extLst>
-            <a:ext uri="{909E8E84-426E-40DD-AFC4-6F175D3DCCD1}">
-              <a14:hiddenFill xmlns:a14="http://schemas.microsoft.com/office/drawing/2010/main">
-                <a:solidFill>
-                  <a:srgbClr val="FFFFFF"/>
-                </a:solidFill>
-              </a14:hiddenFill>
-            </a:ext>
-          </a:extLst>
-        </p:spPr>
-      </p:pic>
-      <p:sp>
-        <p:nvSpPr>
-          <p:cNvPr id="23" name="TextBox 22">
-            <a:extLst>
-              <a:ext uri="{FF2B5EF4-FFF2-40B4-BE49-F238E27FC236}">
-                <a16:creationId xmlns:a16="http://schemas.microsoft.com/office/drawing/2014/main" id="{83D2D3E0-4475-45EA-918B-4FEF1B153184}"/>
-              </a:ext>
-            </a:extLst>
-          </p:cNvPr>
-          <p:cNvSpPr txBox="1"/>
-          <p:nvPr/>
-        </p:nvSpPr>
-        <p:spPr>
-          <a:xfrm>
-            <a:off x="686560" y="2776047"/>
-            <a:ext cx="6029215" cy="523220"/>
-          </a:xfrm>
-          <a:prstGeom prst="rect">
-            <a:avLst/>
-          </a:prstGeom>
-          <a:noFill/>
-        </p:spPr>
-        <p:txBody>
-          <a:bodyPr wrap="none" rtlCol="0">
-            <a:spAutoFit/>
-          </a:bodyPr>
-          <a:lstStyle/>
-          <a:p>
-            <a:r>
-              <a:rPr lang="en-US" sz="2800" dirty="0">
-                <a:solidFill>
-                  <a:schemeClr val="bg2">
-                    <a:lumMod val="25000"/>
-                  </a:schemeClr>
-                </a:solidFill>
-                <a:latin typeface="Bahnschrift Light SemiCondensed" panose="020B0502040204020203" pitchFamily="34" charset="0"/>
-              </a:rPr>
-              <a:t>Moderate results from FB Prophet and AR</a:t>
-            </a:r>
-          </a:p>
-        </p:txBody>
-      </p:sp>
-      <p:sp>
-        <p:nvSpPr>
-          <p:cNvPr id="28" name="Oval 27">
-            <a:extLst>
-              <a:ext uri="{FF2B5EF4-FFF2-40B4-BE49-F238E27FC236}">
-                <a16:creationId xmlns:a16="http://schemas.microsoft.com/office/drawing/2014/main" id="{F695307C-611D-4A70-A743-3D1EDBD73022}"/>
-              </a:ext>
-            </a:extLst>
-          </p:cNvPr>
-          <p:cNvSpPr/>
-          <p:nvPr/>
-        </p:nvSpPr>
-        <p:spPr>
-          <a:xfrm>
-            <a:off x="419860" y="4125263"/>
-            <a:ext cx="202032" cy="224597"/>
-          </a:xfrm>
-          <a:prstGeom prst="ellipse">
-            <a:avLst/>
-          </a:prstGeom>
-          <a:solidFill>
-            <a:schemeClr val="accent1"/>
-          </a:solidFill>
-          <a:ln>
-            <a:noFill/>
-          </a:ln>
-          <a:effectLst>
-            <a:outerShdw blurRad="107950" dist="12700" dir="5400000" algn="ctr">
-              <a:srgbClr val="000000"/>
-            </a:outerShdw>
-          </a:effectLst>
-          <a:scene3d>
-            <a:camera prst="orthographicFront">
-              <a:rot lat="0" lon="0" rev="0"/>
-            </a:camera>
-            <a:lightRig rig="soft" dir="t">
-              <a:rot lat="0" lon="0" rev="0"/>
-            </a:lightRig>
-          </a:scene3d>
-          <a:sp3d contourW="44450" prstMaterial="matte">
-            <a:bevelT w="63500" h="63500" prst="artDeco"/>
-            <a:contourClr>
-              <a:srgbClr val="FFFFFF"/>
-            </a:contourClr>
-          </a:sp3d>
-        </p:spPr>
-        <p:style>
-          <a:lnRef idx="2">
-            <a:schemeClr val="dk1">
-              <a:shade val="50000"/>
-            </a:schemeClr>
-          </a:lnRef>
-          <a:fillRef idx="1">
-            <a:schemeClr val="dk1"/>
-          </a:fillRef>
-          <a:effectRef idx="0">
-            <a:schemeClr val="dk1"/>
-          </a:effectRef>
-          <a:fontRef idx="minor">
-            <a:schemeClr val="lt1"/>
-          </a:fontRef>
-        </p:style>
-        <p:txBody>
-          <a:bodyPr rtlCol="0" anchor="ctr"/>
-          <a:lstStyle/>
-          <a:p>
-            <a:pPr algn="ctr"/>
-            <a:endParaRPr lang="en-US"/>
-          </a:p>
-        </p:txBody>
-      </p:sp>
-      <p:sp>
-        <p:nvSpPr>
-          <p:cNvPr id="29" name="TextBox 28">
-            <a:extLst>
-              <a:ext uri="{FF2B5EF4-FFF2-40B4-BE49-F238E27FC236}">
-                <a16:creationId xmlns:a16="http://schemas.microsoft.com/office/drawing/2014/main" id="{9835D8A8-64EA-4B73-AA6D-E720F3E7A6F0}"/>
-              </a:ext>
-            </a:extLst>
-          </p:cNvPr>
-          <p:cNvSpPr txBox="1"/>
-          <p:nvPr/>
-        </p:nvSpPr>
-        <p:spPr>
-          <a:xfrm>
-            <a:off x="681843" y="3936002"/>
-            <a:ext cx="6402715" cy="523220"/>
-          </a:xfrm>
-          <a:prstGeom prst="rect">
-            <a:avLst/>
-          </a:prstGeom>
-          <a:noFill/>
-        </p:spPr>
-        <p:txBody>
-          <a:bodyPr wrap="none" rtlCol="0">
-            <a:spAutoFit/>
-          </a:bodyPr>
-          <a:lstStyle/>
-          <a:p>
-            <a:r>
-              <a:rPr lang="en-US" sz="2800" dirty="0">
-                <a:solidFill>
-                  <a:schemeClr val="bg2">
-                    <a:lumMod val="25000"/>
-                  </a:schemeClr>
-                </a:solidFill>
-                <a:latin typeface="Bahnschrift Light SemiCondensed" panose="020B0502040204020203" pitchFamily="34" charset="0"/>
-              </a:rPr>
-              <a:t>Effective Visualisations for general audience</a:t>
-            </a:r>
-          </a:p>
-        </p:txBody>
-      </p:sp>
-      <p:sp>
-        <p:nvSpPr>
-          <p:cNvPr id="3" name="Oval 2">
-            <a:extLst>
-              <a:ext uri="{FF2B5EF4-FFF2-40B4-BE49-F238E27FC236}">
-                <a16:creationId xmlns:a16="http://schemas.microsoft.com/office/drawing/2014/main" id="{9D8FC5E6-D745-B049-CF17-7EC6C748AF18}"/>
-              </a:ext>
-            </a:extLst>
-          </p:cNvPr>
-          <p:cNvSpPr/>
-          <p:nvPr/>
-        </p:nvSpPr>
-        <p:spPr>
-          <a:xfrm>
-            <a:off x="439695" y="4751136"/>
-            <a:ext cx="202032" cy="224597"/>
-          </a:xfrm>
-          <a:prstGeom prst="ellipse">
-            <a:avLst/>
-          </a:prstGeom>
-          <a:solidFill>
-            <a:schemeClr val="accent1"/>
-          </a:solidFill>
-          <a:ln>
-            <a:noFill/>
-          </a:ln>
-          <a:effectLst>
-            <a:outerShdw blurRad="107950" dist="12700" dir="5400000" algn="ctr">
-              <a:srgbClr val="000000"/>
-            </a:outerShdw>
-          </a:effectLst>
-          <a:scene3d>
-            <a:camera prst="orthographicFront">
-              <a:rot lat="0" lon="0" rev="0"/>
-            </a:camera>
-            <a:lightRig rig="soft" dir="t">
-              <a:rot lat="0" lon="0" rev="0"/>
-            </a:lightRig>
-          </a:scene3d>
-          <a:sp3d contourW="44450" prstMaterial="matte">
-            <a:bevelT w="63500" h="63500" prst="artDeco"/>
-            <a:contourClr>
-              <a:srgbClr val="FFFFFF"/>
-            </a:contourClr>
-          </a:sp3d>
-        </p:spPr>
-        <p:style>
-          <a:lnRef idx="2">
-            <a:schemeClr val="dk1">
-              <a:shade val="50000"/>
-            </a:schemeClr>
-          </a:lnRef>
-          <a:fillRef idx="1">
-            <a:schemeClr val="dk1"/>
-          </a:fillRef>
-          <a:effectRef idx="0">
-            <a:schemeClr val="dk1"/>
-          </a:effectRef>
-          <a:fontRef idx="minor">
-            <a:schemeClr val="lt1"/>
-          </a:fontRef>
-        </p:style>
-        <p:txBody>
-          <a:bodyPr rtlCol="0" anchor="ctr"/>
-          <a:lstStyle/>
-          <a:p>
-            <a:pPr algn="ctr"/>
-            <a:endParaRPr lang="en-US"/>
-          </a:p>
-        </p:txBody>
-      </p:sp>
-      <p:sp>
-        <p:nvSpPr>
-          <p:cNvPr id="5" name="TextBox 4">
-            <a:extLst>
-              <a:ext uri="{FF2B5EF4-FFF2-40B4-BE49-F238E27FC236}">
-                <a16:creationId xmlns:a16="http://schemas.microsoft.com/office/drawing/2014/main" id="{ECD4C78D-4CF4-B354-E144-5B13A6BBEE76}"/>
-              </a:ext>
-            </a:extLst>
-          </p:cNvPr>
-          <p:cNvSpPr txBox="1"/>
-          <p:nvPr/>
-        </p:nvSpPr>
-        <p:spPr>
-          <a:xfrm>
-            <a:off x="681843" y="4576689"/>
-            <a:ext cx="4972836" cy="523220"/>
-          </a:xfrm>
-          <a:prstGeom prst="rect">
-            <a:avLst/>
-          </a:prstGeom>
-          <a:noFill/>
-        </p:spPr>
-        <p:txBody>
-          <a:bodyPr wrap="none" rtlCol="0">
-            <a:spAutoFit/>
-          </a:bodyPr>
-          <a:lstStyle/>
-          <a:p>
-            <a:r>
-              <a:rPr lang="en-US" sz="2800" dirty="0">
-                <a:solidFill>
-                  <a:schemeClr val="bg2">
-                    <a:lumMod val="25000"/>
-                  </a:schemeClr>
-                </a:solidFill>
-                <a:latin typeface="Bahnschrift Light SemiCondensed" panose="020B0502040204020203" pitchFamily="34" charset="0"/>
-              </a:rPr>
-              <a:t>Most affected People Age , Gender</a:t>
-            </a:r>
-          </a:p>
-        </p:txBody>
-      </p:sp>
-    </p:spTree>
-    <p:extLst>
-      <p:ext uri="{BB962C8B-B14F-4D97-AF65-F5344CB8AC3E}">
-        <p14:creationId xmlns:p14="http://schemas.microsoft.com/office/powerpoint/2010/main" val="2372968877"/>
-      </p:ext>
-    </p:extLst>
-  </p:cSld>
-  <p:clrMapOvr>
-    <a:masterClrMapping/>
-  </p:clrMapOvr>
-  <mc:AlternateContent xmlns:mc="http://schemas.openxmlformats.org/markup-compatibility/2006" xmlns:p14="http://schemas.microsoft.com/office/powerpoint/2010/main">
-    <mc:Choice Requires="p14">
-      <p:transition spd="med" p14:dur="700">
-        <p:fade/>
-      </p:transition>
-    </mc:Choice>
-    <mc:Fallback xmlns="">
-      <p:transition spd="med">
-        <p:fade/>
-      </p:transition>
-    </mc:Fallback>
-  </mc:AlternateContent>
-</p:sld>
-</file>
-
-<file path=ppt/slides/slide7.xml><?xml version="1.0" encoding="utf-8"?>
-<p:sld xmlns:a="http://schemas.openxmlformats.org/drawingml/2006/main" xmlns:r="http://schemas.openxmlformats.org/officeDocument/2006/relationships" xmlns:p="http://schemas.openxmlformats.org/presentationml/2006/main">
-  <p:cSld>
-    <p:spTree>
-      <p:nvGrpSpPr>
-        <p:cNvPr id="1" name=""/>
-        <p:cNvGrpSpPr/>
-        <p:nvPr/>
-      </p:nvGrpSpPr>
-      <p:grpSpPr>
-        <a:xfrm>
-          <a:off x="0" y="0"/>
-          <a:ext cx="0" cy="0"/>
-          <a:chOff x="0" y="0"/>
-          <a:chExt cx="0" cy="0"/>
-        </a:xfrm>
-      </p:grpSpPr>
-      <p:sp>
-        <p:nvSpPr>
-          <p:cNvPr id="4" name="Footer Placeholder 3">
-            <a:extLst>
-              <a:ext uri="{FF2B5EF4-FFF2-40B4-BE49-F238E27FC236}">
-                <a16:creationId xmlns:a16="http://schemas.microsoft.com/office/drawing/2014/main" id="{1D722364-C12C-B2D6-D0A8-2C6FB906CE59}"/>
-              </a:ext>
-            </a:extLst>
-          </p:cNvPr>
-          <p:cNvSpPr>
-            <a:spLocks noGrp="1"/>
-          </p:cNvSpPr>
-          <p:nvPr>
-            <p:ph type="ftr" sz="quarter" idx="11"/>
-          </p:nvPr>
-        </p:nvSpPr>
-        <p:spPr/>
-        <p:txBody>
-          <a:bodyPr/>
-          <a:lstStyle/>
-          <a:p>
-            <a:r>
-              <a:rPr lang="en-US"/>
-              <a:t>Dundalk Institute Of Technology</a:t>
-            </a:r>
-            <a:endParaRPr lang="en-US" dirty="0"/>
-          </a:p>
-        </p:txBody>
-      </p:sp>
-      <p:pic>
-        <p:nvPicPr>
-          <p:cNvPr id="6" name="Picture 5">
-            <a:extLst>
-              <a:ext uri="{FF2B5EF4-FFF2-40B4-BE49-F238E27FC236}">
-                <a16:creationId xmlns:a16="http://schemas.microsoft.com/office/drawing/2014/main" id="{F6F47EE1-AEAF-E92B-3B30-94FF42982033}"/>
+          <p:cNvPr id="8" name="Picture 7">
+            <a:extLst>
+              <a:ext uri="{FF2B5EF4-FFF2-40B4-BE49-F238E27FC236}">
+                <a16:creationId xmlns:a16="http://schemas.microsoft.com/office/drawing/2014/main" id="{AF754ED5-1A2D-D183-9C99-742541B01080}"/>
               </a:ext>
             </a:extLst>
           </p:cNvPr>
@@ -9120,7 +9261,7 @@
           <p:nvPr/>
         </p:nvPicPr>
         <p:blipFill>
-          <a:blip r:embed="rId2"/>
+          <a:blip r:embed="rId3"/>
           <a:stretch>
             <a:fillRect/>
           </a:stretch>
@@ -9138,12 +9279,12 @@
     </p:spTree>
     <p:extLst>
       <p:ext uri="{BB962C8B-B14F-4D97-AF65-F5344CB8AC3E}">
-        <p14:creationId xmlns:p14="http://schemas.microsoft.com/office/powerpoint/2010/main" val="1747825618"/>
+        <p14:creationId xmlns:p14="http://schemas.microsoft.com/office/powerpoint/2010/main" val="1542728865"/>
       </p:ext>
     </p:extLst>
   </p:cSld>
   <p:clrMapOvr>
-    <a:masterClrMapping/>
+    <a:overrideClrMapping bg1="lt1" tx1="dk1" bg2="lt2" tx2="dk2" accent1="accent1" accent2="accent2" accent3="accent3" accent4="accent4" accent5="accent5" accent6="accent6" hlink="hlink" folHlink="folHlink"/>
   </p:clrMapOvr>
 </p:sld>
 </file>
@@ -9597,7 +9738,7 @@
           <p:cNvPr id="4" name="Footer Placeholder 3">
             <a:extLst>
               <a:ext uri="{FF2B5EF4-FFF2-40B4-BE49-F238E27FC236}">
-                <a16:creationId xmlns:a16="http://schemas.microsoft.com/office/drawing/2014/main" id="{AD883D52-986F-3C37-9183-03AA57B120DB}"/>
+                <a16:creationId xmlns:a16="http://schemas.microsoft.com/office/drawing/2014/main" id="{1C4FC1AB-E371-AD89-18B0-C9FDFE3829F6}"/>
               </a:ext>
             </a:extLst>
           </p:cNvPr>
@@ -9706,6 +9847,39 @@
           </a:p>
         </p:txBody>
       </p:sp>
+      <p:pic>
+        <p:nvPicPr>
+          <p:cNvPr id="6" name="Picture 5">
+            <a:extLst>
+              <a:ext uri="{FF2B5EF4-FFF2-40B4-BE49-F238E27FC236}">
+                <a16:creationId xmlns:a16="http://schemas.microsoft.com/office/drawing/2014/main" id="{02E9FA3A-50AF-953C-04F5-C826AD42E734}"/>
+              </a:ext>
+            </a:extLst>
+          </p:cNvPr>
+          <p:cNvPicPr>
+            <a:picLocks noChangeAspect="1"/>
+          </p:cNvPicPr>
+          <p:nvPr/>
+        </p:nvPicPr>
+        <p:blipFill>
+          <a:blip r:embed="rId2"/>
+          <a:stretch>
+            <a:fillRect/>
+          </a:stretch>
+        </p:blipFill>
+        <p:spPr>
+          <a:xfrm>
+            <a:off x="0" y="0"/>
+            <a:ext cx="12192000" cy="6857999"/>
+          </a:xfrm>
+          <a:prstGeom prst="rect">
+            <a:avLst/>
+          </a:prstGeom>
+          <a:ln>
+            <a:noFill/>
+          </a:ln>
+        </p:spPr>
+      </p:pic>
       <p:sp>
         <p:nvSpPr>
           <p:cNvPr id="23" name="Isosceles Triangle 22">
@@ -9771,12 +9945,71 @@
           </a:p>
         </p:txBody>
       </p:sp>
+    </p:spTree>
+    <p:extLst>
+      <p:ext uri="{BB962C8B-B14F-4D97-AF65-F5344CB8AC3E}">
+        <p14:creationId xmlns:p14="http://schemas.microsoft.com/office/powerpoint/2010/main" val="3075489028"/>
+      </p:ext>
+    </p:extLst>
+  </p:cSld>
+  <p:clrMapOvr>
+    <a:masterClrMapping/>
+  </p:clrMapOvr>
+</p:sld>
+</file>
+
+<file path=ppt/slides/slide9.xml><?xml version="1.0" encoding="utf-8"?>
+<p:sld xmlns:a="http://schemas.openxmlformats.org/drawingml/2006/main" xmlns:r="http://schemas.openxmlformats.org/officeDocument/2006/relationships" xmlns:p="http://schemas.openxmlformats.org/presentationml/2006/main">
+  <p:cSld>
+    <p:spTree>
+      <p:nvGrpSpPr>
+        <p:cNvPr id="1" name=""/>
+        <p:cNvGrpSpPr/>
+        <p:nvPr/>
+      </p:nvGrpSpPr>
+      <p:grpSpPr>
+        <a:xfrm>
+          <a:off x="0" y="0"/>
+          <a:ext cx="0" cy="0"/>
+          <a:chOff x="0" y="0"/>
+          <a:chExt cx="0" cy="0"/>
+        </a:xfrm>
+      </p:grpSpPr>
+      <p:sp>
+        <p:nvSpPr>
+          <p:cNvPr id="4" name="Footer Placeholder 3">
+            <a:extLst>
+              <a:ext uri="{FF2B5EF4-FFF2-40B4-BE49-F238E27FC236}">
+                <a16:creationId xmlns:a16="http://schemas.microsoft.com/office/drawing/2014/main" id="{3D86EA1F-4003-772F-F5A3-075A007CAD07}"/>
+              </a:ext>
+            </a:extLst>
+          </p:cNvPr>
+          <p:cNvSpPr>
+            <a:spLocks noGrp="1"/>
+          </p:cNvSpPr>
+          <p:nvPr>
+            <p:ph type="ftr" sz="quarter" idx="11"/>
+          </p:nvPr>
+        </p:nvSpPr>
+        <p:spPr/>
+        <p:txBody>
+          <a:bodyPr/>
+          <a:lstStyle/>
+          <a:p>
+            <a:r>
+              <a:rPr lang="en-US"/>
+              <a:t>Dundalk Institute Of Technology</a:t>
+            </a:r>
+            <a:endParaRPr lang="en-US" dirty="0"/>
+          </a:p>
+        </p:txBody>
+      </p:sp>
       <p:pic>
         <p:nvPicPr>
-          <p:cNvPr id="8" name="Picture 7">
-            <a:extLst>
-              <a:ext uri="{FF2B5EF4-FFF2-40B4-BE49-F238E27FC236}">
-                <a16:creationId xmlns:a16="http://schemas.microsoft.com/office/drawing/2014/main" id="{AF754ED5-1A2D-D183-9C99-742541B01080}"/>
+          <p:cNvPr id="6" name="Picture 5">
+            <a:extLst>
+              <a:ext uri="{FF2B5EF4-FFF2-40B4-BE49-F238E27FC236}">
+                <a16:creationId xmlns:a16="http://schemas.microsoft.com/office/drawing/2014/main" id="{EF9B36AB-42F8-1B12-CE70-8243FF58FD69}"/>
               </a:ext>
             </a:extLst>
           </p:cNvPr>
@@ -9804,676 +10037,7 @@
     </p:spTree>
     <p:extLst>
       <p:ext uri="{BB962C8B-B14F-4D97-AF65-F5344CB8AC3E}">
-        <p14:creationId xmlns:p14="http://schemas.microsoft.com/office/powerpoint/2010/main" val="1542728865"/>
-      </p:ext>
-    </p:extLst>
-  </p:cSld>
-  <p:clrMapOvr>
-    <a:masterClrMapping/>
-  </p:clrMapOvr>
-</p:sld>
-</file>
-
-<file path=ppt/slides/slide9.xml><?xml version="1.0" encoding="utf-8"?>
-<p:sld xmlns:a="http://schemas.openxmlformats.org/drawingml/2006/main" xmlns:r="http://schemas.openxmlformats.org/officeDocument/2006/relationships" xmlns:p="http://schemas.openxmlformats.org/presentationml/2006/main">
-  <p:cSld>
-    <p:bg>
-      <p:bgPr>
-        <a:solidFill>
-          <a:schemeClr val="bg1"/>
-        </a:solidFill>
-        <a:effectLst/>
-      </p:bgPr>
-    </p:bg>
-    <p:spTree>
-      <p:nvGrpSpPr>
-        <p:cNvPr id="1" name=""/>
-        <p:cNvGrpSpPr/>
-        <p:nvPr/>
-      </p:nvGrpSpPr>
-      <p:grpSpPr>
-        <a:xfrm>
-          <a:off x="0" y="0"/>
-          <a:ext cx="0" cy="0"/>
-          <a:chOff x="0" y="0"/>
-          <a:chExt cx="0" cy="0"/>
-        </a:xfrm>
-      </p:grpSpPr>
-      <p:sp>
-        <p:nvSpPr>
-          <p:cNvPr id="11" name="Rectangle 10">
-            <a:extLst>
-              <a:ext uri="{FF2B5EF4-FFF2-40B4-BE49-F238E27FC236}">
-                <a16:creationId xmlns:a16="http://schemas.microsoft.com/office/drawing/2014/main" id="{F3060C83-F051-4F0E-ABAD-AA0DFC48B218}"/>
-              </a:ext>
-              <a:ext uri="{C183D7F6-B498-43B3-948B-1728B52AA6E4}">
-                <adec:decorative xmlns:adec="http://schemas.microsoft.com/office/drawing/2017/decorative" val="1"/>
-              </a:ext>
-            </a:extLst>
-          </p:cNvPr>
-          <p:cNvSpPr>
-            <a:spLocks noGrp="1" noRot="1" noChangeAspect="1" noMove="1" noResize="1" noEditPoints="1" noAdjustHandles="1" noChangeArrowheads="1" noChangeShapeType="1" noTextEdit="1"/>
-          </p:cNvSpPr>
-          <p:nvPr>
-            <p:extLst>
-              <p:ext uri="{386F3935-93C4-4BCD-93E2-E3B085C9AB24}">
-                <p16:designElem xmlns:p16="http://schemas.microsoft.com/office/powerpoint/2015/main" val="1"/>
-              </p:ext>
-            </p:extLst>
-          </p:nvPr>
-        </p:nvSpPr>
-        <p:spPr>
-          <a:xfrm>
-            <a:off x="0" y="0"/>
-            <a:ext cx="12192000" cy="6858000"/>
-          </a:xfrm>
-          <a:prstGeom prst="rect">
-            <a:avLst/>
-          </a:prstGeom>
-          <a:solidFill>
-            <a:schemeClr val="bg1"/>
-          </a:solidFill>
-          <a:ln>
-            <a:noFill/>
-          </a:ln>
-        </p:spPr>
-        <p:style>
-          <a:lnRef idx="2">
-            <a:schemeClr val="accent1">
-              <a:shade val="50000"/>
-            </a:schemeClr>
-          </a:lnRef>
-          <a:fillRef idx="1">
-            <a:schemeClr val="accent1"/>
-          </a:fillRef>
-          <a:effectRef idx="0">
-            <a:schemeClr val="accent1"/>
-          </a:effectRef>
-          <a:fontRef idx="minor">
-            <a:schemeClr val="lt1"/>
-          </a:fontRef>
-        </p:style>
-        <p:txBody>
-          <a:bodyPr rtlCol="0" anchor="ctr"/>
-          <a:lstStyle/>
-          <a:p>
-            <a:pPr algn="ctr"/>
-            <a:endParaRPr lang="en-US" dirty="0"/>
-          </a:p>
-        </p:txBody>
-      </p:sp>
-      <p:sp>
-        <p:nvSpPr>
-          <p:cNvPr id="13" name="Freeform: Shape 12">
-            <a:extLst>
-              <a:ext uri="{FF2B5EF4-FFF2-40B4-BE49-F238E27FC236}">
-                <a16:creationId xmlns:a16="http://schemas.microsoft.com/office/drawing/2014/main" id="{83C98ABE-055B-441F-B07E-44F97F083C39}"/>
-              </a:ext>
-              <a:ext uri="{C183D7F6-B498-43B3-948B-1728B52AA6E4}">
-                <adec:decorative xmlns:adec="http://schemas.microsoft.com/office/drawing/2017/decorative" val="1"/>
-              </a:ext>
-            </a:extLst>
-          </p:cNvPr>
-          <p:cNvSpPr>
-            <a:spLocks noGrp="1" noRot="1" noChangeAspect="1" noMove="1" noResize="1" noEditPoints="1" noAdjustHandles="1" noChangeArrowheads="1" noChangeShapeType="1" noTextEdit="1"/>
-          </p:cNvSpPr>
-          <p:nvPr>
-            <p:extLst>
-              <p:ext uri="{386F3935-93C4-4BCD-93E2-E3B085C9AB24}">
-                <p16:designElem xmlns:p16="http://schemas.microsoft.com/office/powerpoint/2015/main" val="1"/>
-              </p:ext>
-            </p:extLst>
-          </p:nvPr>
-        </p:nvSpPr>
-        <p:spPr>
-          <a:xfrm rot="18900000" flipH="1">
-            <a:off x="-376156" y="-253670"/>
-            <a:ext cx="1827638" cy="1376989"/>
-          </a:xfrm>
-          <a:custGeom>
-            <a:avLst/>
-            <a:gdLst>
-              <a:gd name="connsiteX0" fmla="*/ 0 w 1827638"/>
-              <a:gd name="connsiteY0" fmla="*/ 987379 h 1376989"/>
-              <a:gd name="connsiteX1" fmla="*/ 987379 w 1827638"/>
-              <a:gd name="connsiteY1" fmla="*/ 0 h 1376989"/>
-              <a:gd name="connsiteX2" fmla="*/ 1827638 w 1827638"/>
-              <a:gd name="connsiteY2" fmla="*/ 840260 h 1376989"/>
-              <a:gd name="connsiteX3" fmla="*/ 1827638 w 1827638"/>
-              <a:gd name="connsiteY3" fmla="*/ 1376989 h 1376989"/>
-              <a:gd name="connsiteX4" fmla="*/ 0 w 1827638"/>
-              <a:gd name="connsiteY4" fmla="*/ 1376989 h 1376989"/>
-            </a:gdLst>
-            <a:ahLst/>
-            <a:cxnLst>
-              <a:cxn ang="0">
-                <a:pos x="connsiteX0" y="connsiteY0"/>
-              </a:cxn>
-              <a:cxn ang="0">
-                <a:pos x="connsiteX1" y="connsiteY1"/>
-              </a:cxn>
-              <a:cxn ang="0">
-                <a:pos x="connsiteX2" y="connsiteY2"/>
-              </a:cxn>
-              <a:cxn ang="0">
-                <a:pos x="connsiteX3" y="connsiteY3"/>
-              </a:cxn>
-              <a:cxn ang="0">
-                <a:pos x="connsiteX4" y="connsiteY4"/>
-              </a:cxn>
-            </a:cxnLst>
-            <a:rect l="l" t="t" r="r" b="b"/>
-            <a:pathLst>
-              <a:path w="1827638" h="1376989">
-                <a:moveTo>
-                  <a:pt x="0" y="987379"/>
-                </a:moveTo>
-                <a:lnTo>
-                  <a:pt x="987379" y="0"/>
-                </a:lnTo>
-                <a:lnTo>
-                  <a:pt x="1827638" y="840260"/>
-                </a:lnTo>
-                <a:lnTo>
-                  <a:pt x="1827638" y="1376989"/>
-                </a:lnTo>
-                <a:lnTo>
-                  <a:pt x="0" y="1376989"/>
-                </a:lnTo>
-                <a:close/>
-              </a:path>
-            </a:pathLst>
-          </a:custGeom>
-          <a:solidFill>
-            <a:schemeClr val="accent1">
-              <a:alpha val="30000"/>
-            </a:schemeClr>
-          </a:solidFill>
-          <a:ln>
-            <a:noFill/>
-          </a:ln>
-        </p:spPr>
-        <p:style>
-          <a:lnRef idx="2">
-            <a:schemeClr val="accent1">
-              <a:shade val="50000"/>
-            </a:schemeClr>
-          </a:lnRef>
-          <a:fillRef idx="1">
-            <a:schemeClr val="accent1"/>
-          </a:fillRef>
-          <a:effectRef idx="0">
-            <a:schemeClr val="accent1"/>
-          </a:effectRef>
-          <a:fontRef idx="minor">
-            <a:schemeClr val="lt1"/>
-          </a:fontRef>
-        </p:style>
-        <p:txBody>
-          <a:bodyPr rtlCol="0" anchor="ctr"/>
-          <a:lstStyle/>
-          <a:p>
-            <a:pPr algn="ctr"/>
-            <a:endParaRPr lang="en-US" dirty="0"/>
-          </a:p>
-        </p:txBody>
-      </p:sp>
-      <p:sp>
-        <p:nvSpPr>
-          <p:cNvPr id="15" name="Rectangle 14">
-            <a:extLst>
-              <a:ext uri="{FF2B5EF4-FFF2-40B4-BE49-F238E27FC236}">
-                <a16:creationId xmlns:a16="http://schemas.microsoft.com/office/drawing/2014/main" id="{29FDB030-9B49-4CED-8CCD-4D99382388AC}"/>
-              </a:ext>
-              <a:ext uri="{C183D7F6-B498-43B3-948B-1728B52AA6E4}">
-                <adec:decorative xmlns:adec="http://schemas.microsoft.com/office/drawing/2017/decorative" val="1"/>
-              </a:ext>
-            </a:extLst>
-          </p:cNvPr>
-          <p:cNvSpPr>
-            <a:spLocks noGrp="1" noRot="1" noChangeAspect="1" noMove="1" noResize="1" noEditPoints="1" noAdjustHandles="1" noChangeArrowheads="1" noChangeShapeType="1" noTextEdit="1"/>
-          </p:cNvSpPr>
-          <p:nvPr>
-            <p:extLst>
-              <p:ext uri="{386F3935-93C4-4BCD-93E2-E3B085C9AB24}">
-                <p16:designElem xmlns:p16="http://schemas.microsoft.com/office/powerpoint/2015/main" val="1"/>
-              </p:ext>
-            </p:extLst>
-          </p:nvPr>
-        </p:nvSpPr>
-        <p:spPr>
-          <a:xfrm rot="18900000" flipH="1">
-            <a:off x="891641" y="422146"/>
-            <a:ext cx="645368" cy="645368"/>
-          </a:xfrm>
-          <a:prstGeom prst="rect">
-            <a:avLst/>
-          </a:prstGeom>
-          <a:solidFill>
-            <a:schemeClr val="accent1">
-              <a:alpha val="30000"/>
-            </a:schemeClr>
-          </a:solidFill>
-          <a:ln>
-            <a:noFill/>
-          </a:ln>
-        </p:spPr>
-        <p:style>
-          <a:lnRef idx="2">
-            <a:schemeClr val="accent1">
-              <a:shade val="50000"/>
-            </a:schemeClr>
-          </a:lnRef>
-          <a:fillRef idx="1">
-            <a:schemeClr val="accent1"/>
-          </a:fillRef>
-          <a:effectRef idx="0">
-            <a:schemeClr val="accent1"/>
-          </a:effectRef>
-          <a:fontRef idx="minor">
-            <a:schemeClr val="lt1"/>
-          </a:fontRef>
-        </p:style>
-        <p:txBody>
-          <a:bodyPr rtlCol="0" anchor="ctr"/>
-          <a:lstStyle/>
-          <a:p>
-            <a:pPr algn="ctr"/>
-            <a:endParaRPr lang="en-US"/>
-          </a:p>
-        </p:txBody>
-      </p:sp>
-      <p:sp>
-        <p:nvSpPr>
-          <p:cNvPr id="17" name="Rectangle 16">
-            <a:extLst>
-              <a:ext uri="{FF2B5EF4-FFF2-40B4-BE49-F238E27FC236}">
-                <a16:creationId xmlns:a16="http://schemas.microsoft.com/office/drawing/2014/main" id="{3783CA14-24A1-485C-8B30-D6A5D87987AD}"/>
-              </a:ext>
-              <a:ext uri="{C183D7F6-B498-43B3-948B-1728B52AA6E4}">
-                <adec:decorative xmlns:adec="http://schemas.microsoft.com/office/drawing/2017/decorative" val="1"/>
-              </a:ext>
-            </a:extLst>
-          </p:cNvPr>
-          <p:cNvSpPr>
-            <a:spLocks noGrp="1" noRot="1" noChangeAspect="1" noMove="1" noResize="1" noEditPoints="1" noAdjustHandles="1" noChangeArrowheads="1" noChangeShapeType="1" noTextEdit="1"/>
-          </p:cNvSpPr>
-          <p:nvPr>
-            <p:extLst>
-              <p:ext uri="{386F3935-93C4-4BCD-93E2-E3B085C9AB24}">
-                <p16:designElem xmlns:p16="http://schemas.microsoft.com/office/powerpoint/2015/main" val="1"/>
-              </p:ext>
-            </p:extLst>
-          </p:nvPr>
-        </p:nvSpPr>
-        <p:spPr>
-          <a:xfrm rot="18900000" flipH="1">
-            <a:off x="10043482" y="655140"/>
-            <a:ext cx="687472" cy="687472"/>
-          </a:xfrm>
-          <a:prstGeom prst="rect">
-            <a:avLst/>
-          </a:prstGeom>
-          <a:solidFill>
-            <a:schemeClr val="accent4">
-              <a:alpha val="30000"/>
-            </a:schemeClr>
-          </a:solidFill>
-          <a:ln>
-            <a:noFill/>
-          </a:ln>
-        </p:spPr>
-        <p:style>
-          <a:lnRef idx="2">
-            <a:schemeClr val="accent1">
-              <a:shade val="50000"/>
-            </a:schemeClr>
-          </a:lnRef>
-          <a:fillRef idx="1">
-            <a:schemeClr val="accent1"/>
-          </a:fillRef>
-          <a:effectRef idx="0">
-            <a:schemeClr val="accent1"/>
-          </a:effectRef>
-          <a:fontRef idx="minor">
-            <a:schemeClr val="lt1"/>
-          </a:fontRef>
-        </p:style>
-        <p:txBody>
-          <a:bodyPr rtlCol="0" anchor="ctr"/>
-          <a:lstStyle/>
-          <a:p>
-            <a:pPr algn="ctr"/>
-            <a:endParaRPr lang="en-US"/>
-          </a:p>
-        </p:txBody>
-      </p:sp>
-      <p:sp>
-        <p:nvSpPr>
-          <p:cNvPr id="19" name="Freeform: Shape 18">
-            <a:extLst>
-              <a:ext uri="{FF2B5EF4-FFF2-40B4-BE49-F238E27FC236}">
-                <a16:creationId xmlns:a16="http://schemas.microsoft.com/office/drawing/2014/main" id="{9A97C86A-04D6-40F7-AE84-31AB43E6A846}"/>
-              </a:ext>
-              <a:ext uri="{C183D7F6-B498-43B3-948B-1728B52AA6E4}">
-                <adec:decorative xmlns:adec="http://schemas.microsoft.com/office/drawing/2017/decorative" val="1"/>
-              </a:ext>
-            </a:extLst>
-          </p:cNvPr>
-          <p:cNvSpPr>
-            <a:spLocks noGrp="1" noRot="1" noChangeAspect="1" noMove="1" noResize="1" noEditPoints="1" noAdjustHandles="1" noChangeArrowheads="1" noChangeShapeType="1" noTextEdit="1"/>
-          </p:cNvSpPr>
-          <p:nvPr>
-            <p:extLst>
-              <p:ext uri="{386F3935-93C4-4BCD-93E2-E3B085C9AB24}">
-                <p16:designElem xmlns:p16="http://schemas.microsoft.com/office/powerpoint/2015/main" val="1"/>
-              </p:ext>
-            </p:extLst>
-          </p:nvPr>
-        </p:nvSpPr>
-        <p:spPr>
-          <a:xfrm rot="10800000" flipH="1">
-            <a:off x="9356643" y="0"/>
-            <a:ext cx="2835357" cy="1480837"/>
-          </a:xfrm>
-          <a:custGeom>
-            <a:avLst/>
-            <a:gdLst>
-              <a:gd name="connsiteX0" fmla="*/ 2835357 w 2835357"/>
-              <a:gd name="connsiteY0" fmla="*/ 1480837 h 1480837"/>
-              <a:gd name="connsiteX1" fmla="*/ 0 w 2835357"/>
-              <a:gd name="connsiteY1" fmla="*/ 1480837 h 1480837"/>
-              <a:gd name="connsiteX2" fmla="*/ 1552727 w 2835357"/>
-              <a:gd name="connsiteY2" fmla="*/ 0 h 1480837"/>
-              <a:gd name="connsiteX3" fmla="*/ 2835357 w 2835357"/>
-              <a:gd name="connsiteY3" fmla="*/ 1223245 h 1480837"/>
-            </a:gdLst>
-            <a:ahLst/>
-            <a:cxnLst>
-              <a:cxn ang="0">
-                <a:pos x="connsiteX0" y="connsiteY0"/>
-              </a:cxn>
-              <a:cxn ang="0">
-                <a:pos x="connsiteX1" y="connsiteY1"/>
-              </a:cxn>
-              <a:cxn ang="0">
-                <a:pos x="connsiteX2" y="connsiteY2"/>
-              </a:cxn>
-              <a:cxn ang="0">
-                <a:pos x="connsiteX3" y="connsiteY3"/>
-              </a:cxn>
-            </a:cxnLst>
-            <a:rect l="l" t="t" r="r" b="b"/>
-            <a:pathLst>
-              <a:path w="2835357" h="1480837">
-                <a:moveTo>
-                  <a:pt x="2835357" y="1480837"/>
-                </a:moveTo>
-                <a:lnTo>
-                  <a:pt x="0" y="1480837"/>
-                </a:lnTo>
-                <a:lnTo>
-                  <a:pt x="1552727" y="0"/>
-                </a:lnTo>
-                <a:lnTo>
-                  <a:pt x="2835357" y="1223245"/>
-                </a:lnTo>
-                <a:close/>
-              </a:path>
-            </a:pathLst>
-          </a:custGeom>
-          <a:solidFill>
-            <a:schemeClr val="accent4">
-              <a:alpha val="30000"/>
-            </a:schemeClr>
-          </a:solidFill>
-          <a:ln>
-            <a:noFill/>
-          </a:ln>
-        </p:spPr>
-        <p:style>
-          <a:lnRef idx="2">
-            <a:schemeClr val="accent1">
-              <a:shade val="50000"/>
-            </a:schemeClr>
-          </a:lnRef>
-          <a:fillRef idx="1">
-            <a:schemeClr val="accent1"/>
-          </a:fillRef>
-          <a:effectRef idx="0">
-            <a:schemeClr val="accent1"/>
-          </a:effectRef>
-          <a:fontRef idx="minor">
-            <a:schemeClr val="lt1"/>
-          </a:fontRef>
-        </p:style>
-        <p:txBody>
-          <a:bodyPr wrap="square" rtlCol="0" anchor="ctr">
-            <a:noAutofit/>
-          </a:bodyPr>
-          <a:lstStyle/>
-          <a:p>
-            <a:pPr algn="ctr"/>
-            <a:endParaRPr lang="en-US" dirty="0"/>
-          </a:p>
-        </p:txBody>
-      </p:sp>
-      <p:sp>
-        <p:nvSpPr>
-          <p:cNvPr id="4" name="Footer Placeholder 3">
-            <a:extLst>
-              <a:ext uri="{FF2B5EF4-FFF2-40B4-BE49-F238E27FC236}">
-                <a16:creationId xmlns:a16="http://schemas.microsoft.com/office/drawing/2014/main" id="{1C4FC1AB-E371-AD89-18B0-C9FDFE3829F6}"/>
-              </a:ext>
-            </a:extLst>
-          </p:cNvPr>
-          <p:cNvSpPr>
-            <a:spLocks noGrp="1"/>
-          </p:cNvSpPr>
-          <p:nvPr>
-            <p:ph type="ftr" sz="quarter" idx="11"/>
-          </p:nvPr>
-        </p:nvSpPr>
-        <p:spPr>
-          <a:xfrm>
-            <a:off x="4038600" y="6356350"/>
-            <a:ext cx="4114800" cy="365125"/>
-          </a:xfrm>
-        </p:spPr>
-        <p:txBody>
-          <a:bodyPr vert="horz" lIns="91440" tIns="45720" rIns="91440" bIns="45720" rtlCol="0" anchor="ctr">
-            <a:normAutofit/>
-          </a:bodyPr>
-          <a:lstStyle/>
-          <a:p>
-            <a:pPr>
-              <a:spcAft>
-                <a:spcPts val="600"/>
-              </a:spcAft>
-            </a:pPr>
-            <a:r>
-              <a:rPr lang="en-US" kern="1200">
-                <a:solidFill>
-                  <a:schemeClr val="tx1">
-                    <a:tint val="75000"/>
-                  </a:schemeClr>
-                </a:solidFill>
-                <a:latin typeface="+mn-lt"/>
-                <a:ea typeface="+mn-ea"/>
-                <a:cs typeface="+mn-cs"/>
-              </a:rPr>
-              <a:t>Dundalk Institute Of Technology</a:t>
-            </a:r>
-          </a:p>
-        </p:txBody>
-      </p:sp>
-      <p:sp>
-        <p:nvSpPr>
-          <p:cNvPr id="21" name="Isosceles Triangle 20">
-            <a:extLst>
-              <a:ext uri="{FF2B5EF4-FFF2-40B4-BE49-F238E27FC236}">
-                <a16:creationId xmlns:a16="http://schemas.microsoft.com/office/drawing/2014/main" id="{FF9F2414-84E8-453E-B1F3-389FDE8192D9}"/>
-              </a:ext>
-              <a:ext uri="{C183D7F6-B498-43B3-948B-1728B52AA6E4}">
-                <adec:decorative xmlns:adec="http://schemas.microsoft.com/office/drawing/2017/decorative" val="1"/>
-              </a:ext>
-            </a:extLst>
-          </p:cNvPr>
-          <p:cNvSpPr>
-            <a:spLocks noGrp="1" noRot="1" noChangeAspect="1" noMove="1" noResize="1" noEditPoints="1" noAdjustHandles="1" noChangeArrowheads="1" noChangeShapeType="1" noTextEdit="1"/>
-          </p:cNvSpPr>
-          <p:nvPr>
-            <p:extLst>
-              <p:ext uri="{386F3935-93C4-4BCD-93E2-E3B085C9AB24}">
-                <p16:designElem xmlns:p16="http://schemas.microsoft.com/office/powerpoint/2015/main" val="1"/>
-              </p:ext>
-            </p:extLst>
-          </p:nvPr>
-        </p:nvSpPr>
-        <p:spPr>
-          <a:xfrm flipH="1">
-            <a:off x="7976344" y="6115501"/>
-            <a:ext cx="1494513" cy="742499"/>
-          </a:xfrm>
-          <a:prstGeom prst="triangle">
-            <a:avLst/>
-          </a:prstGeom>
-          <a:solidFill>
-            <a:schemeClr val="accent1">
-              <a:alpha val="30000"/>
-            </a:schemeClr>
-          </a:solidFill>
-          <a:ln>
-            <a:noFill/>
-          </a:ln>
-        </p:spPr>
-        <p:style>
-          <a:lnRef idx="2">
-            <a:schemeClr val="accent1">
-              <a:shade val="50000"/>
-            </a:schemeClr>
-          </a:lnRef>
-          <a:fillRef idx="1">
-            <a:schemeClr val="accent1"/>
-          </a:fillRef>
-          <a:effectRef idx="0">
-            <a:schemeClr val="accent1"/>
-          </a:effectRef>
-          <a:fontRef idx="minor">
-            <a:schemeClr val="lt1"/>
-          </a:fontRef>
-        </p:style>
-        <p:txBody>
-          <a:bodyPr rtlCol="0" anchor="ctr"/>
-          <a:lstStyle/>
-          <a:p>
-            <a:pPr algn="ctr"/>
-            <a:endParaRPr lang="en-US"/>
-          </a:p>
-        </p:txBody>
-      </p:sp>
-      <p:pic>
-        <p:nvPicPr>
-          <p:cNvPr id="6" name="Picture 5">
-            <a:extLst>
-              <a:ext uri="{FF2B5EF4-FFF2-40B4-BE49-F238E27FC236}">
-                <a16:creationId xmlns:a16="http://schemas.microsoft.com/office/drawing/2014/main" id="{02E9FA3A-50AF-953C-04F5-C826AD42E734}"/>
-              </a:ext>
-            </a:extLst>
-          </p:cNvPr>
-          <p:cNvPicPr>
-            <a:picLocks noChangeAspect="1"/>
-          </p:cNvPicPr>
-          <p:nvPr/>
-        </p:nvPicPr>
-        <p:blipFill>
-          <a:blip r:embed="rId2"/>
-          <a:stretch>
-            <a:fillRect/>
-          </a:stretch>
-        </p:blipFill>
-        <p:spPr>
-          <a:xfrm>
-            <a:off x="1143942" y="643467"/>
-            <a:ext cx="9904116" cy="5571065"/>
-          </a:xfrm>
-          <a:prstGeom prst="rect">
-            <a:avLst/>
-          </a:prstGeom>
-          <a:ln>
-            <a:noFill/>
-          </a:ln>
-        </p:spPr>
-      </p:pic>
-      <p:sp>
-        <p:nvSpPr>
-          <p:cNvPr id="23" name="Isosceles Triangle 22">
-            <a:extLst>
-              <a:ext uri="{FF2B5EF4-FFF2-40B4-BE49-F238E27FC236}">
-                <a16:creationId xmlns:a16="http://schemas.microsoft.com/office/drawing/2014/main" id="{3ECA69A1-7536-43AC-85EF-C7106179F5ED}"/>
-              </a:ext>
-              <a:ext uri="{C183D7F6-B498-43B3-948B-1728B52AA6E4}">
-                <adec:decorative xmlns:adec="http://schemas.microsoft.com/office/drawing/2017/decorative" val="1"/>
-              </a:ext>
-            </a:extLst>
-          </p:cNvPr>
-          <p:cNvSpPr>
-            <a:spLocks noGrp="1" noRot="1" noChangeAspect="1" noMove="1" noResize="1" noEditPoints="1" noAdjustHandles="1" noChangeArrowheads="1" noChangeShapeType="1" noTextEdit="1"/>
-          </p:cNvSpPr>
-          <p:nvPr>
-            <p:extLst>
-              <p:ext uri="{386F3935-93C4-4BCD-93E2-E3B085C9AB24}">
-                <p16:designElem xmlns:p16="http://schemas.microsoft.com/office/powerpoint/2015/main" val="1"/>
-              </p:ext>
-            </p:extLst>
-          </p:nvPr>
-        </p:nvSpPr>
-        <p:spPr>
-          <a:xfrm flipH="1">
-            <a:off x="7604080" y="6453143"/>
-            <a:ext cx="814903" cy="404857"/>
-          </a:xfrm>
-          <a:prstGeom prst="triangle">
-            <a:avLst/>
-          </a:prstGeom>
-          <a:solidFill>
-            <a:schemeClr val="accent1">
-              <a:alpha val="30000"/>
-            </a:schemeClr>
-          </a:solidFill>
-          <a:ln>
-            <a:noFill/>
-          </a:ln>
-        </p:spPr>
-        <p:style>
-          <a:lnRef idx="2">
-            <a:schemeClr val="accent1">
-              <a:shade val="50000"/>
-            </a:schemeClr>
-          </a:lnRef>
-          <a:fillRef idx="1">
-            <a:schemeClr val="accent1"/>
-          </a:fillRef>
-          <a:effectRef idx="0">
-            <a:schemeClr val="accent1"/>
-          </a:effectRef>
-          <a:fontRef idx="minor">
-            <a:schemeClr val="lt1"/>
-          </a:fontRef>
-        </p:style>
-        <p:txBody>
-          <a:bodyPr rtlCol="0" anchor="ctr"/>
-          <a:lstStyle/>
-          <a:p>
-            <a:pPr algn="ctr"/>
-            <a:endParaRPr lang="en-US"/>
-          </a:p>
-        </p:txBody>
-      </p:sp>
-    </p:spTree>
-    <p:extLst>
-      <p:ext uri="{BB962C8B-B14F-4D97-AF65-F5344CB8AC3E}">
-        <p14:creationId xmlns:p14="http://schemas.microsoft.com/office/powerpoint/2010/main" val="3075489028"/>
+        <p14:creationId xmlns:p14="http://schemas.microsoft.com/office/powerpoint/2010/main" val="2518949505"/>
       </p:ext>
     </p:extLst>
   </p:cSld>
@@ -11272,4 +10836,47 @@
     </a:ext>
   </a:extLst>
 </a:theme>
+</file>
+
+<file path=ppt/theme/themeOverride1.xml><?xml version="1.0" encoding="utf-8"?>
+<a:themeOverride xmlns:a="http://schemas.openxmlformats.org/drawingml/2006/main">
+  <a:clrScheme name="Office">
+    <a:dk1>
+      <a:sysClr val="windowText" lastClr="000000"/>
+    </a:dk1>
+    <a:lt1>
+      <a:sysClr val="window" lastClr="FFFFFF"/>
+    </a:lt1>
+    <a:dk2>
+      <a:srgbClr val="44546A"/>
+    </a:dk2>
+    <a:lt2>
+      <a:srgbClr val="E7E6E6"/>
+    </a:lt2>
+    <a:accent1>
+      <a:srgbClr val="4472C4"/>
+    </a:accent1>
+    <a:accent2>
+      <a:srgbClr val="ED7D31"/>
+    </a:accent2>
+    <a:accent3>
+      <a:srgbClr val="A5A5A5"/>
+    </a:accent3>
+    <a:accent4>
+      <a:srgbClr val="FFC000"/>
+    </a:accent4>
+    <a:accent5>
+      <a:srgbClr val="5B9BD5"/>
+    </a:accent5>
+    <a:accent6>
+      <a:srgbClr val="70AD47"/>
+    </a:accent6>
+    <a:hlink>
+      <a:srgbClr val="0563C1"/>
+    </a:hlink>
+    <a:folHlink>
+      <a:srgbClr val="954F72"/>
+    </a:folHlink>
+  </a:clrScheme>
+</a:themeOverride>
 </file>
</xml_diff>